<commit_message>
replaced day 5 lectures
</commit_message>
<xml_diff>
--- a/Day_5/Lectures/Day_5_Lecture_1_Introduction_to_Deep_Learning.pptx
+++ b/Day_5/Lectures/Day_5_Lecture_1_Introduction_to_Deep_Learning.pptx
@@ -917,7 +917,7 @@
   <p:cSld>
     <p:spTree>
       <p:nvGrpSpPr>
-        <p:cNvPr id="249" name="Shape 249"/>
+        <p:cNvPr id="250" name="Shape 250"/>
         <p:cNvGrpSpPr/>
         <p:nvPr/>
       </p:nvGrpSpPr>
@@ -931,7 +931,7 @@
       </p:grpSpPr>
       <p:sp>
         <p:nvSpPr>
-          <p:cNvPr id="250" name="Google Shape;250;g1126c875379_0_32:notes"/>
+          <p:cNvPr id="251" name="Google Shape;251;g1126c875379_0_32:notes"/>
           <p:cNvSpPr/>
           <p:nvPr>
             <p:ph idx="2" type="sldImg"/>
@@ -966,7 +966,7 @@
       </p:sp>
       <p:sp>
         <p:nvSpPr>
-          <p:cNvPr id="251" name="Google Shape;251;g1126c875379_0_32:notes"/>
+          <p:cNvPr id="252" name="Google Shape;252;g1126c875379_0_32:notes"/>
           <p:cNvSpPr txBox="1"/>
           <p:nvPr>
             <p:ph idx="1" type="body"/>
@@ -1336,7 +1336,7 @@
   <p:cSld>
     <p:spTree>
       <p:nvGrpSpPr>
-        <p:cNvPr id="259" name="Shape 259"/>
+        <p:cNvPr id="260" name="Shape 260"/>
         <p:cNvGrpSpPr/>
         <p:nvPr/>
       </p:nvGrpSpPr>
@@ -1350,7 +1350,7 @@
       </p:grpSpPr>
       <p:sp>
         <p:nvSpPr>
-          <p:cNvPr id="260" name="Google Shape;260;g1126c875379_0_46:notes"/>
+          <p:cNvPr id="261" name="Google Shape;261;g1126c875379_0_46:notes"/>
           <p:cNvSpPr/>
           <p:nvPr>
             <p:ph idx="2" type="sldImg"/>
@@ -1385,7 +1385,7 @@
       </p:sp>
       <p:sp>
         <p:nvSpPr>
-          <p:cNvPr id="261" name="Google Shape;261;g1126c875379_0_46:notes"/>
+          <p:cNvPr id="262" name="Google Shape;262;g1126c875379_0_46:notes"/>
           <p:cNvSpPr txBox="1"/>
           <p:nvPr>
             <p:ph idx="1" type="body"/>
@@ -1755,7 +1755,7 @@
   <p:cSld>
     <p:spTree>
       <p:nvGrpSpPr>
-        <p:cNvPr id="269" name="Shape 269"/>
+        <p:cNvPr id="270" name="Shape 270"/>
         <p:cNvGrpSpPr/>
         <p:nvPr/>
       </p:nvGrpSpPr>
@@ -1769,7 +1769,7 @@
       </p:grpSpPr>
       <p:sp>
         <p:nvSpPr>
-          <p:cNvPr id="270" name="Google Shape;270;g1126c875379_0_55:notes"/>
+          <p:cNvPr id="271" name="Google Shape;271;g1126c875379_0_55:notes"/>
           <p:cNvSpPr/>
           <p:nvPr>
             <p:ph idx="2" type="sldImg"/>
@@ -1804,7 +1804,7 @@
       </p:sp>
       <p:sp>
         <p:nvSpPr>
-          <p:cNvPr id="271" name="Google Shape;271;g1126c875379_0_55:notes"/>
+          <p:cNvPr id="272" name="Google Shape;272;g1126c875379_0_55:notes"/>
           <p:cNvSpPr txBox="1"/>
           <p:nvPr>
             <p:ph idx="1" type="body"/>
@@ -2174,7 +2174,7 @@
   <p:cSld>
     <p:spTree>
       <p:nvGrpSpPr>
-        <p:cNvPr id="279" name="Shape 279"/>
+        <p:cNvPr id="280" name="Shape 280"/>
         <p:cNvGrpSpPr/>
         <p:nvPr/>
       </p:nvGrpSpPr>
@@ -2188,7 +2188,7 @@
       </p:grpSpPr>
       <p:sp>
         <p:nvSpPr>
-          <p:cNvPr id="280" name="Google Shape;280;g1126c875379_0_64:notes"/>
+          <p:cNvPr id="281" name="Google Shape;281;g1126c875379_0_64:notes"/>
           <p:cNvSpPr/>
           <p:nvPr>
             <p:ph idx="2" type="sldImg"/>
@@ -2223,7 +2223,7 @@
       </p:sp>
       <p:sp>
         <p:nvSpPr>
-          <p:cNvPr id="281" name="Google Shape;281;g1126c875379_0_64:notes"/>
+          <p:cNvPr id="282" name="Google Shape;282;g1126c875379_0_64:notes"/>
           <p:cNvSpPr txBox="1"/>
           <p:nvPr>
             <p:ph idx="1" type="body"/>
@@ -2593,7 +2593,7 @@
   <p:cSld>
     <p:spTree>
       <p:nvGrpSpPr>
-        <p:cNvPr id="289" name="Shape 289"/>
+        <p:cNvPr id="290" name="Shape 290"/>
         <p:cNvGrpSpPr/>
         <p:nvPr/>
       </p:nvGrpSpPr>
@@ -2607,7 +2607,7 @@
       </p:grpSpPr>
       <p:sp>
         <p:nvSpPr>
-          <p:cNvPr id="290" name="Google Shape;290;g116be71d717_0_0:notes"/>
+          <p:cNvPr id="291" name="Google Shape;291;g116be71d717_0_0:notes"/>
           <p:cNvSpPr/>
           <p:nvPr>
             <p:ph idx="2" type="sldImg"/>
@@ -2642,7 +2642,7 @@
       </p:sp>
       <p:sp>
         <p:nvSpPr>
-          <p:cNvPr id="291" name="Google Shape;291;g116be71d717_0_0:notes"/>
+          <p:cNvPr id="292" name="Google Shape;292;g116be71d717_0_0:notes"/>
           <p:cNvSpPr txBox="1"/>
           <p:nvPr>
             <p:ph idx="1" type="body"/>
@@ -3012,7 +3012,7 @@
   <p:cSld>
     <p:spTree>
       <p:nvGrpSpPr>
-        <p:cNvPr id="299" name="Shape 299"/>
+        <p:cNvPr id="300" name="Shape 300"/>
         <p:cNvGrpSpPr/>
         <p:nvPr/>
       </p:nvGrpSpPr>
@@ -3026,7 +3026,7 @@
       </p:grpSpPr>
       <p:sp>
         <p:nvSpPr>
-          <p:cNvPr id="300" name="Google Shape;300;g1126c875379_0_73:notes"/>
+          <p:cNvPr id="301" name="Google Shape;301;g1126c875379_0_73:notes"/>
           <p:cNvSpPr/>
           <p:nvPr>
             <p:ph idx="2" type="sldImg"/>
@@ -3061,7 +3061,7 @@
       </p:sp>
       <p:sp>
         <p:nvSpPr>
-          <p:cNvPr id="301" name="Google Shape;301;g1126c875379_0_73:notes"/>
+          <p:cNvPr id="302" name="Google Shape;302;g1126c875379_0_73:notes"/>
           <p:cNvSpPr txBox="1"/>
           <p:nvPr>
             <p:ph idx="1" type="body"/>
@@ -3431,7 +3431,7 @@
   <p:cSld>
     <p:spTree>
       <p:nvGrpSpPr>
-        <p:cNvPr id="310" name="Shape 310"/>
+        <p:cNvPr id="311" name="Shape 311"/>
         <p:cNvGrpSpPr/>
         <p:nvPr/>
       </p:nvGrpSpPr>
@@ -3445,7 +3445,7 @@
       </p:grpSpPr>
       <p:sp>
         <p:nvSpPr>
-          <p:cNvPr id="311" name="Google Shape;311;g1126c875379_0_85:notes"/>
+          <p:cNvPr id="312" name="Google Shape;312;g1126c875379_0_85:notes"/>
           <p:cNvSpPr/>
           <p:nvPr>
             <p:ph idx="2" type="sldImg"/>
@@ -3480,7 +3480,7 @@
       </p:sp>
       <p:sp>
         <p:nvSpPr>
-          <p:cNvPr id="312" name="Google Shape;312;g1126c875379_0_85:notes"/>
+          <p:cNvPr id="313" name="Google Shape;313;g1126c875379_0_85:notes"/>
           <p:cNvSpPr txBox="1"/>
           <p:nvPr>
             <p:ph idx="1" type="body"/>
@@ -3850,7 +3850,7 @@
   <p:cSld>
     <p:spTree>
       <p:nvGrpSpPr>
-        <p:cNvPr id="320" name="Shape 320"/>
+        <p:cNvPr id="321" name="Shape 321"/>
         <p:cNvGrpSpPr/>
         <p:nvPr/>
       </p:nvGrpSpPr>
@@ -3864,7 +3864,7 @@
       </p:grpSpPr>
       <p:sp>
         <p:nvSpPr>
-          <p:cNvPr id="321" name="Google Shape;321;g1126c875379_0_97:notes"/>
+          <p:cNvPr id="322" name="Google Shape;322;g1126c875379_0_97:notes"/>
           <p:cNvSpPr/>
           <p:nvPr>
             <p:ph idx="2" type="sldImg"/>
@@ -3899,7 +3899,7 @@
       </p:sp>
       <p:sp>
         <p:nvSpPr>
-          <p:cNvPr id="322" name="Google Shape;322;g1126c875379_0_97:notes"/>
+          <p:cNvPr id="323" name="Google Shape;323;g1126c875379_0_97:notes"/>
           <p:cNvSpPr txBox="1"/>
           <p:nvPr>
             <p:ph idx="1" type="body"/>
@@ -4269,7 +4269,7 @@
   <p:cSld>
     <p:spTree>
       <p:nvGrpSpPr>
-        <p:cNvPr id="330" name="Shape 330"/>
+        <p:cNvPr id="331" name="Shape 331"/>
         <p:cNvGrpSpPr/>
         <p:nvPr/>
       </p:nvGrpSpPr>
@@ -4283,7 +4283,7 @@
       </p:grpSpPr>
       <p:sp>
         <p:nvSpPr>
-          <p:cNvPr id="331" name="Google Shape;331;g1126c875379_0_107:notes"/>
+          <p:cNvPr id="332" name="Google Shape;332;g1126c875379_0_107:notes"/>
           <p:cNvSpPr/>
           <p:nvPr>
             <p:ph idx="2" type="sldImg"/>
@@ -4318,7 +4318,7 @@
       </p:sp>
       <p:sp>
         <p:nvSpPr>
-          <p:cNvPr id="332" name="Google Shape;332;g1126c875379_0_107:notes"/>
+          <p:cNvPr id="333" name="Google Shape;333;g1126c875379_0_107:notes"/>
           <p:cNvSpPr txBox="1"/>
           <p:nvPr>
             <p:ph idx="1" type="body"/>
@@ -4688,7 +4688,7 @@
   <p:cSld>
     <p:spTree>
       <p:nvGrpSpPr>
-        <p:cNvPr id="340" name="Shape 340"/>
+        <p:cNvPr id="341" name="Shape 341"/>
         <p:cNvGrpSpPr/>
         <p:nvPr/>
       </p:nvGrpSpPr>
@@ -4702,7 +4702,7 @@
       </p:grpSpPr>
       <p:sp>
         <p:nvSpPr>
-          <p:cNvPr id="341" name="Google Shape;341;g1126c875379_0_116:notes"/>
+          <p:cNvPr id="342" name="Google Shape;342;g1126c875379_0_116:notes"/>
           <p:cNvSpPr/>
           <p:nvPr>
             <p:ph idx="2" type="sldImg"/>
@@ -4737,7 +4737,7 @@
       </p:sp>
       <p:sp>
         <p:nvSpPr>
-          <p:cNvPr id="342" name="Google Shape;342;g1126c875379_0_116:notes"/>
+          <p:cNvPr id="343" name="Google Shape;343;g1126c875379_0_116:notes"/>
           <p:cNvSpPr txBox="1"/>
           <p:nvPr>
             <p:ph idx="1" type="body"/>
@@ -5107,7 +5107,7 @@
   <p:cSld>
     <p:spTree>
       <p:nvGrpSpPr>
-        <p:cNvPr id="179" name="Shape 179"/>
+        <p:cNvPr id="180" name="Shape 180"/>
         <p:cNvGrpSpPr/>
         <p:nvPr/>
       </p:nvGrpSpPr>
@@ -5121,7 +5121,7 @@
       </p:grpSpPr>
       <p:sp>
         <p:nvSpPr>
-          <p:cNvPr id="180" name="Google Shape;180;g129c2c475a1_0_156:notes"/>
+          <p:cNvPr id="181" name="Google Shape;181;g129c2c475a1_0_156:notes"/>
           <p:cNvSpPr/>
           <p:nvPr>
             <p:ph idx="2" type="sldImg"/>
@@ -5156,7 +5156,7 @@
       </p:sp>
       <p:sp>
         <p:nvSpPr>
-          <p:cNvPr id="181" name="Google Shape;181;g129c2c475a1_0_156:notes"/>
+          <p:cNvPr id="182" name="Google Shape;182;g129c2c475a1_0_156:notes"/>
           <p:cNvSpPr txBox="1"/>
           <p:nvPr>
             <p:ph idx="1" type="body"/>
@@ -5206,7 +5206,7 @@
   <p:cSld>
     <p:spTree>
       <p:nvGrpSpPr>
-        <p:cNvPr id="350" name="Shape 350"/>
+        <p:cNvPr id="351" name="Shape 351"/>
         <p:cNvGrpSpPr/>
         <p:nvPr/>
       </p:nvGrpSpPr>
@@ -5220,7 +5220,7 @@
       </p:grpSpPr>
       <p:sp>
         <p:nvSpPr>
-          <p:cNvPr id="351" name="Google Shape;351;g1126c875379_0_126:notes"/>
+          <p:cNvPr id="352" name="Google Shape;352;g1126c875379_0_126:notes"/>
           <p:cNvSpPr/>
           <p:nvPr>
             <p:ph idx="2" type="sldImg"/>
@@ -5255,7 +5255,7 @@
       </p:sp>
       <p:sp>
         <p:nvSpPr>
-          <p:cNvPr id="352" name="Google Shape;352;g1126c875379_0_126:notes"/>
+          <p:cNvPr id="353" name="Google Shape;353;g1126c875379_0_126:notes"/>
           <p:cNvSpPr txBox="1"/>
           <p:nvPr>
             <p:ph idx="1" type="body"/>
@@ -5625,7 +5625,7 @@
   <p:cSld>
     <p:spTree>
       <p:nvGrpSpPr>
-        <p:cNvPr id="358" name="Shape 358"/>
+        <p:cNvPr id="359" name="Shape 359"/>
         <p:cNvGrpSpPr/>
         <p:nvPr/>
       </p:nvGrpSpPr>
@@ -5639,7 +5639,7 @@
       </p:grpSpPr>
       <p:sp>
         <p:nvSpPr>
-          <p:cNvPr id="359" name="Google Shape;359;g1126c875379_0_134:notes"/>
+          <p:cNvPr id="360" name="Google Shape;360;g1126c875379_0_134:notes"/>
           <p:cNvSpPr/>
           <p:nvPr>
             <p:ph idx="2" type="sldImg"/>
@@ -5674,7 +5674,7 @@
       </p:sp>
       <p:sp>
         <p:nvSpPr>
-          <p:cNvPr id="360" name="Google Shape;360;g1126c875379_0_134:notes"/>
+          <p:cNvPr id="361" name="Google Shape;361;g1126c875379_0_134:notes"/>
           <p:cNvSpPr txBox="1"/>
           <p:nvPr>
             <p:ph idx="1" type="body"/>
@@ -6044,7 +6044,7 @@
   <p:cSld>
     <p:spTree>
       <p:nvGrpSpPr>
-        <p:cNvPr id="366" name="Shape 366"/>
+        <p:cNvPr id="367" name="Shape 367"/>
         <p:cNvGrpSpPr/>
         <p:nvPr/>
       </p:nvGrpSpPr>
@@ -6058,7 +6058,7 @@
       </p:grpSpPr>
       <p:sp>
         <p:nvSpPr>
-          <p:cNvPr id="367" name="Google Shape;367;g1126c875379_0_140:notes"/>
+          <p:cNvPr id="368" name="Google Shape;368;g1126c875379_0_140:notes"/>
           <p:cNvSpPr/>
           <p:nvPr>
             <p:ph idx="2" type="sldImg"/>
@@ -6093,7 +6093,7 @@
       </p:sp>
       <p:sp>
         <p:nvSpPr>
-          <p:cNvPr id="368" name="Google Shape;368;g1126c875379_0_140:notes"/>
+          <p:cNvPr id="369" name="Google Shape;369;g1126c875379_0_140:notes"/>
           <p:cNvSpPr txBox="1"/>
           <p:nvPr>
             <p:ph idx="1" type="body"/>
@@ -6463,7 +6463,7 @@
   <p:cSld>
     <p:spTree>
       <p:nvGrpSpPr>
-        <p:cNvPr id="374" name="Shape 374"/>
+        <p:cNvPr id="375" name="Shape 375"/>
         <p:cNvGrpSpPr/>
         <p:nvPr/>
       </p:nvGrpSpPr>
@@ -6477,7 +6477,7 @@
       </p:grpSpPr>
       <p:sp>
         <p:nvSpPr>
-          <p:cNvPr id="375" name="Google Shape;375;g1126c875379_0_146:notes"/>
+          <p:cNvPr id="376" name="Google Shape;376;g1126c875379_0_146:notes"/>
           <p:cNvSpPr/>
           <p:nvPr>
             <p:ph idx="2" type="sldImg"/>
@@ -6512,7 +6512,7 @@
       </p:sp>
       <p:sp>
         <p:nvSpPr>
-          <p:cNvPr id="376" name="Google Shape;376;g1126c875379_0_146:notes"/>
+          <p:cNvPr id="377" name="Google Shape;377;g1126c875379_0_146:notes"/>
           <p:cNvSpPr txBox="1"/>
           <p:nvPr>
             <p:ph idx="1" type="body"/>
@@ -6882,7 +6882,7 @@
   <p:cSld>
     <p:spTree>
       <p:nvGrpSpPr>
-        <p:cNvPr id="385" name="Shape 385"/>
+        <p:cNvPr id="386" name="Shape 386"/>
         <p:cNvGrpSpPr/>
         <p:nvPr/>
       </p:nvGrpSpPr>
@@ -6896,7 +6896,7 @@
       </p:grpSpPr>
       <p:sp>
         <p:nvSpPr>
-          <p:cNvPr id="386" name="Google Shape;386;g1126c875379_0_166:notes"/>
+          <p:cNvPr id="387" name="Google Shape;387;g1126c875379_0_166:notes"/>
           <p:cNvSpPr/>
           <p:nvPr>
             <p:ph idx="2" type="sldImg"/>
@@ -6931,7 +6931,7 @@
       </p:sp>
       <p:sp>
         <p:nvSpPr>
-          <p:cNvPr id="387" name="Google Shape;387;g1126c875379_0_166:notes"/>
+          <p:cNvPr id="388" name="Google Shape;388;g1126c875379_0_166:notes"/>
           <p:cNvSpPr txBox="1"/>
           <p:nvPr>
             <p:ph idx="1" type="body"/>
@@ -7301,7 +7301,7 @@
   <p:cSld>
     <p:spTree>
       <p:nvGrpSpPr>
-        <p:cNvPr id="395" name="Shape 395"/>
+        <p:cNvPr id="396" name="Shape 396"/>
         <p:cNvGrpSpPr/>
         <p:nvPr/>
       </p:nvGrpSpPr>
@@ -7315,7 +7315,7 @@
       </p:grpSpPr>
       <p:sp>
         <p:nvSpPr>
-          <p:cNvPr id="396" name="Google Shape;396;g1126c875379_0_183:notes"/>
+          <p:cNvPr id="397" name="Google Shape;397;g1126c875379_0_183:notes"/>
           <p:cNvSpPr/>
           <p:nvPr>
             <p:ph idx="2" type="sldImg"/>
@@ -7350,7 +7350,7 @@
       </p:sp>
       <p:sp>
         <p:nvSpPr>
-          <p:cNvPr id="397" name="Google Shape;397;g1126c875379_0_183:notes"/>
+          <p:cNvPr id="398" name="Google Shape;398;g1126c875379_0_183:notes"/>
           <p:cNvSpPr txBox="1"/>
           <p:nvPr>
             <p:ph idx="1" type="body"/>
@@ -7720,7 +7720,7 @@
   <p:cSld>
     <p:spTree>
       <p:nvGrpSpPr>
-        <p:cNvPr id="405" name="Shape 405"/>
+        <p:cNvPr id="406" name="Shape 406"/>
         <p:cNvGrpSpPr/>
         <p:nvPr/>
       </p:nvGrpSpPr>
@@ -7734,7 +7734,7 @@
       </p:grpSpPr>
       <p:sp>
         <p:nvSpPr>
-          <p:cNvPr id="406" name="Google Shape;406;g1126c875379_0_193:notes"/>
+          <p:cNvPr id="407" name="Google Shape;407;g1126c875379_0_193:notes"/>
           <p:cNvSpPr/>
           <p:nvPr>
             <p:ph idx="2" type="sldImg"/>
@@ -7769,7 +7769,7 @@
       </p:sp>
       <p:sp>
         <p:nvSpPr>
-          <p:cNvPr id="407" name="Google Shape;407;g1126c875379_0_193:notes"/>
+          <p:cNvPr id="408" name="Google Shape;408;g1126c875379_0_193:notes"/>
           <p:cNvSpPr txBox="1"/>
           <p:nvPr>
             <p:ph idx="1" type="body"/>
@@ -8139,7 +8139,7 @@
   <p:cSld>
     <p:spTree>
       <p:nvGrpSpPr>
-        <p:cNvPr id="413" name="Shape 413"/>
+        <p:cNvPr id="414" name="Shape 414"/>
         <p:cNvGrpSpPr/>
         <p:nvPr/>
       </p:nvGrpSpPr>
@@ -8153,7 +8153,7 @@
       </p:grpSpPr>
       <p:sp>
         <p:nvSpPr>
-          <p:cNvPr id="414" name="Google Shape;414;g11e66af5a24_0_0:notes"/>
+          <p:cNvPr id="415" name="Google Shape;415;g11e66af5a24_0_0:notes"/>
           <p:cNvSpPr/>
           <p:nvPr>
             <p:ph idx="2" type="sldImg"/>
@@ -8188,7 +8188,7 @@
       </p:sp>
       <p:sp>
         <p:nvSpPr>
-          <p:cNvPr id="415" name="Google Shape;415;g11e66af5a24_0_0:notes"/>
+          <p:cNvPr id="416" name="Google Shape;416;g11e66af5a24_0_0:notes"/>
           <p:cNvSpPr txBox="1"/>
           <p:nvPr>
             <p:ph idx="1" type="body"/>
@@ -8558,7 +8558,7 @@
   <p:cSld>
     <p:spTree>
       <p:nvGrpSpPr>
-        <p:cNvPr id="422" name="Shape 422"/>
+        <p:cNvPr id="423" name="Shape 423"/>
         <p:cNvGrpSpPr/>
         <p:nvPr/>
       </p:nvGrpSpPr>
@@ -8572,7 +8572,7 @@
       </p:grpSpPr>
       <p:sp>
         <p:nvSpPr>
-          <p:cNvPr id="423" name="Google Shape;423;g126f43ec652_0_94:notes"/>
+          <p:cNvPr id="424" name="Google Shape;424;g126f43ec652_0_94:notes"/>
           <p:cNvSpPr/>
           <p:nvPr>
             <p:ph idx="2" type="sldImg"/>
@@ -8607,7 +8607,7 @@
       </p:sp>
       <p:sp>
         <p:nvSpPr>
-          <p:cNvPr id="424" name="Google Shape;424;g126f43ec652_0_94:notes"/>
+          <p:cNvPr id="425" name="Google Shape;425;g126f43ec652_0_94:notes"/>
           <p:cNvSpPr txBox="1"/>
           <p:nvPr>
             <p:ph idx="1" type="body"/>
@@ -8657,7 +8657,7 @@
   <p:cSld>
     <p:spTree>
       <p:nvGrpSpPr>
-        <p:cNvPr id="439" name="Shape 439"/>
+        <p:cNvPr id="440" name="Shape 440"/>
         <p:cNvGrpSpPr/>
         <p:nvPr/>
       </p:nvGrpSpPr>
@@ -8671,7 +8671,7 @@
       </p:grpSpPr>
       <p:sp>
         <p:nvSpPr>
-          <p:cNvPr id="440" name="Google Shape;440;g110cd4518f6_0_0:notes"/>
+          <p:cNvPr id="441" name="Google Shape;441;g110cd4518f6_0_0:notes"/>
           <p:cNvSpPr/>
           <p:nvPr>
             <p:ph idx="2" type="sldImg"/>
@@ -8706,7 +8706,7 @@
       </p:sp>
       <p:sp>
         <p:nvSpPr>
-          <p:cNvPr id="441" name="Google Shape;441;g110cd4518f6_0_0:notes"/>
+          <p:cNvPr id="442" name="Google Shape;442;g110cd4518f6_0_0:notes"/>
           <p:cNvSpPr txBox="1"/>
           <p:nvPr>
             <p:ph idx="1" type="body"/>
@@ -8756,7 +8756,7 @@
   <p:cSld>
     <p:spTree>
       <p:nvGrpSpPr>
-        <p:cNvPr id="188" name="Shape 188"/>
+        <p:cNvPr id="189" name="Shape 189"/>
         <p:cNvGrpSpPr/>
         <p:nvPr/>
       </p:nvGrpSpPr>
@@ -8770,7 +8770,7 @@
       </p:grpSpPr>
       <p:sp>
         <p:nvSpPr>
-          <p:cNvPr id="189" name="Google Shape;189;g129c2c475a1_0_208:notes"/>
+          <p:cNvPr id="190" name="Google Shape;190;g129c2c475a1_0_208:notes"/>
           <p:cNvSpPr/>
           <p:nvPr>
             <p:ph idx="2" type="sldImg"/>
@@ -8805,7 +8805,7 @@
       </p:sp>
       <p:sp>
         <p:nvSpPr>
-          <p:cNvPr id="190" name="Google Shape;190;g129c2c475a1_0_208:notes"/>
+          <p:cNvPr id="191" name="Google Shape;191;g129c2c475a1_0_208:notes"/>
           <p:cNvSpPr txBox="1"/>
           <p:nvPr>
             <p:ph idx="1" type="body"/>
@@ -8855,7 +8855,7 @@
   <p:cSld>
     <p:spTree>
       <p:nvGrpSpPr>
-        <p:cNvPr id="196" name="Shape 196"/>
+        <p:cNvPr id="197" name="Shape 197"/>
         <p:cNvGrpSpPr/>
         <p:nvPr/>
       </p:nvGrpSpPr>
@@ -8869,7 +8869,7 @@
       </p:grpSpPr>
       <p:sp>
         <p:nvSpPr>
-          <p:cNvPr id="197" name="Google Shape;197;g129d4660fea_0_54:notes"/>
+          <p:cNvPr id="198" name="Google Shape;198;g129d4660fea_0_54:notes"/>
           <p:cNvSpPr/>
           <p:nvPr>
             <p:ph idx="2" type="sldImg"/>
@@ -8904,7 +8904,7 @@
       </p:sp>
       <p:sp>
         <p:nvSpPr>
-          <p:cNvPr id="198" name="Google Shape;198;g129d4660fea_0_54:notes"/>
+          <p:cNvPr id="199" name="Google Shape;199;g129d4660fea_0_54:notes"/>
           <p:cNvSpPr txBox="1"/>
           <p:nvPr>
             <p:ph idx="1" type="body"/>
@@ -8954,7 +8954,7 @@
   <p:cSld>
     <p:spTree>
       <p:nvGrpSpPr>
-        <p:cNvPr id="205" name="Shape 205"/>
+        <p:cNvPr id="206" name="Shape 206"/>
         <p:cNvGrpSpPr/>
         <p:nvPr/>
       </p:nvGrpSpPr>
@@ -8968,7 +8968,7 @@
       </p:grpSpPr>
       <p:sp>
         <p:nvSpPr>
-          <p:cNvPr id="206" name="Google Shape;206;g10c858bddf3_0_0:notes"/>
+          <p:cNvPr id="207" name="Google Shape;207;g10c858bddf3_0_0:notes"/>
           <p:cNvSpPr/>
           <p:nvPr>
             <p:ph idx="2" type="sldImg"/>
@@ -9003,7 +9003,7 @@
       </p:sp>
       <p:sp>
         <p:nvSpPr>
-          <p:cNvPr id="207" name="Google Shape;207;g10c858bddf3_0_0:notes"/>
+          <p:cNvPr id="208" name="Google Shape;208;g10c858bddf3_0_0:notes"/>
           <p:cNvSpPr txBox="1"/>
           <p:nvPr>
             <p:ph idx="1" type="body"/>
@@ -9053,7 +9053,7 @@
   <p:cSld>
     <p:spTree>
       <p:nvGrpSpPr>
-        <p:cNvPr id="213" name="Shape 213"/>
+        <p:cNvPr id="214" name="Shape 214"/>
         <p:cNvGrpSpPr/>
         <p:nvPr/>
       </p:nvGrpSpPr>
@@ -9067,7 +9067,7 @@
       </p:grpSpPr>
       <p:sp>
         <p:nvSpPr>
-          <p:cNvPr id="214" name="Google Shape;214;g1126c875379_0_1:notes"/>
+          <p:cNvPr id="215" name="Google Shape;215;g1126c875379_0_1:notes"/>
           <p:cNvSpPr/>
           <p:nvPr>
             <p:ph idx="2" type="sldImg"/>
@@ -9102,7 +9102,7 @@
       </p:sp>
       <p:sp>
         <p:nvSpPr>
-          <p:cNvPr id="215" name="Google Shape;215;g1126c875379_0_1:notes"/>
+          <p:cNvPr id="216" name="Google Shape;216;g1126c875379_0_1:notes"/>
           <p:cNvSpPr txBox="1"/>
           <p:nvPr>
             <p:ph idx="1" type="body"/>
@@ -9152,7 +9152,7 @@
   <p:cSld>
     <p:spTree>
       <p:nvGrpSpPr>
-        <p:cNvPr id="221" name="Shape 221"/>
+        <p:cNvPr id="222" name="Shape 222"/>
         <p:cNvGrpSpPr/>
         <p:nvPr/>
       </p:nvGrpSpPr>
@@ -9166,7 +9166,7 @@
       </p:grpSpPr>
       <p:sp>
         <p:nvSpPr>
-          <p:cNvPr id="222" name="Google Shape;222;g1126c875379_0_7:notes"/>
+          <p:cNvPr id="223" name="Google Shape;223;g1126c875379_0_7:notes"/>
           <p:cNvSpPr/>
           <p:nvPr>
             <p:ph idx="2" type="sldImg"/>
@@ -9201,7 +9201,7 @@
       </p:sp>
       <p:sp>
         <p:nvSpPr>
-          <p:cNvPr id="223" name="Google Shape;223;g1126c875379_0_7:notes"/>
+          <p:cNvPr id="224" name="Google Shape;224;g1126c875379_0_7:notes"/>
           <p:cNvSpPr txBox="1"/>
           <p:nvPr>
             <p:ph idx="1" type="body"/>
@@ -9251,7 +9251,7 @@
   <p:cSld>
     <p:spTree>
       <p:nvGrpSpPr>
-        <p:cNvPr id="231" name="Shape 231"/>
+        <p:cNvPr id="232" name="Shape 232"/>
         <p:cNvGrpSpPr/>
         <p:nvPr/>
       </p:nvGrpSpPr>
@@ -9265,7 +9265,7 @@
       </p:grpSpPr>
       <p:sp>
         <p:nvSpPr>
-          <p:cNvPr id="232" name="Google Shape;232;g1126c875379_0_15:notes"/>
+          <p:cNvPr id="233" name="Google Shape;233;g1126c875379_0_15:notes"/>
           <p:cNvSpPr/>
           <p:nvPr>
             <p:ph idx="2" type="sldImg"/>
@@ -9300,7 +9300,7 @@
       </p:sp>
       <p:sp>
         <p:nvSpPr>
-          <p:cNvPr id="233" name="Google Shape;233;g1126c875379_0_15:notes"/>
+          <p:cNvPr id="234" name="Google Shape;234;g1126c875379_0_15:notes"/>
           <p:cNvSpPr txBox="1"/>
           <p:nvPr>
             <p:ph idx="1" type="body"/>
@@ -9350,7 +9350,7 @@
   <p:cSld>
     <p:spTree>
       <p:nvGrpSpPr>
-        <p:cNvPr id="239" name="Shape 239"/>
+        <p:cNvPr id="240" name="Shape 240"/>
         <p:cNvGrpSpPr/>
         <p:nvPr/>
       </p:nvGrpSpPr>
@@ -9364,7 +9364,7 @@
       </p:grpSpPr>
       <p:sp>
         <p:nvSpPr>
-          <p:cNvPr id="240" name="Google Shape;240;g1126c875379_0_23:notes"/>
+          <p:cNvPr id="241" name="Google Shape;241;g1126c875379_0_23:notes"/>
           <p:cNvSpPr/>
           <p:nvPr>
             <p:ph idx="2" type="sldImg"/>
@@ -9399,7 +9399,7 @@
       </p:sp>
       <p:sp>
         <p:nvSpPr>
-          <p:cNvPr id="241" name="Google Shape;241;g1126c875379_0_23:notes"/>
+          <p:cNvPr id="242" name="Google Shape;242;g1126c875379_0_23:notes"/>
           <p:cNvSpPr txBox="1"/>
           <p:nvPr>
             <p:ph idx="1" type="body"/>
@@ -25758,6 +25758,34 @@
           </a:p>
         </p:txBody>
       </p:sp>
+      <p:pic>
+        <p:nvPicPr>
+          <p:cNvPr id="179" name="Google Shape;179;p37"/>
+          <p:cNvPicPr preferRelativeResize="0"/>
+          <p:nvPr/>
+        </p:nvPicPr>
+        <p:blipFill>
+          <a:blip r:embed="rId5">
+            <a:alphaModFix/>
+          </a:blip>
+          <a:stretch>
+            <a:fillRect/>
+          </a:stretch>
+        </p:blipFill>
+        <p:spPr>
+          <a:xfrm>
+            <a:off x="7959900" y="3603500"/>
+            <a:ext cx="872400" cy="872400"/>
+          </a:xfrm>
+          <a:prstGeom prst="rect">
+            <a:avLst/>
+          </a:prstGeom>
+          <a:noFill/>
+          <a:ln>
+            <a:noFill/>
+          </a:ln>
+        </p:spPr>
+      </p:pic>
     </p:spTree>
   </p:cSld>
   <p:clrMapOvr>
@@ -25771,7 +25799,7 @@
   <p:cSld>
     <p:spTree>
       <p:nvGrpSpPr>
-        <p:cNvPr id="252" name="Shape 252"/>
+        <p:cNvPr id="253" name="Shape 253"/>
         <p:cNvGrpSpPr/>
         <p:nvPr/>
       </p:nvGrpSpPr>
@@ -25785,7 +25813,7 @@
       </p:grpSpPr>
       <p:pic>
         <p:nvPicPr>
-          <p:cNvPr id="253" name="Google Shape;253;p46"/>
+          <p:cNvPr id="254" name="Google Shape;254;p46"/>
           <p:cNvPicPr preferRelativeResize="0"/>
           <p:nvPr/>
         </p:nvPicPr>
@@ -25813,7 +25841,7 @@
       </p:pic>
       <p:sp>
         <p:nvSpPr>
-          <p:cNvPr id="254" name="Google Shape;254;p46"/>
+          <p:cNvPr id="255" name="Google Shape;255;p46"/>
           <p:cNvSpPr txBox="1"/>
           <p:nvPr>
             <p:ph type="title"/>
@@ -25861,7 +25889,7 @@
       </p:sp>
       <p:sp>
         <p:nvSpPr>
-          <p:cNvPr id="255" name="Google Shape;255;p46"/>
+          <p:cNvPr id="256" name="Google Shape;256;p46"/>
           <p:cNvSpPr txBox="1"/>
           <p:nvPr>
             <p:ph idx="4294967295" type="body"/>
@@ -25953,7 +25981,7 @@
       </p:sp>
       <p:sp>
         <p:nvSpPr>
-          <p:cNvPr id="256" name="Google Shape;256;p46"/>
+          <p:cNvPr id="257" name="Google Shape;257;p46"/>
           <p:cNvSpPr txBox="1"/>
           <p:nvPr>
             <p:ph idx="12" type="sldNum"/>
@@ -26001,7 +26029,7 @@
       </p:sp>
       <p:sp>
         <p:nvSpPr>
-          <p:cNvPr id="257" name="Google Shape;257;p46"/>
+          <p:cNvPr id="258" name="Google Shape;258;p46"/>
           <p:cNvSpPr txBox="1"/>
           <p:nvPr/>
         </p:nvSpPr>
@@ -26053,7 +26081,7 @@
       </p:sp>
       <p:pic>
         <p:nvPicPr>
-          <p:cNvPr id="258" name="Google Shape;258;p46"/>
+          <p:cNvPr id="259" name="Google Shape;259;p46"/>
           <p:cNvPicPr preferRelativeResize="0"/>
           <p:nvPr/>
         </p:nvPicPr>
@@ -26092,7 +26120,7 @@
   <p:cSld>
     <p:spTree>
       <p:nvGrpSpPr>
-        <p:cNvPr id="262" name="Shape 262"/>
+        <p:cNvPr id="263" name="Shape 263"/>
         <p:cNvGrpSpPr/>
         <p:nvPr/>
       </p:nvGrpSpPr>
@@ -26106,7 +26134,7 @@
       </p:grpSpPr>
       <p:pic>
         <p:nvPicPr>
-          <p:cNvPr id="263" name="Google Shape;263;p47"/>
+          <p:cNvPr id="264" name="Google Shape;264;p47"/>
           <p:cNvPicPr preferRelativeResize="0"/>
           <p:nvPr/>
         </p:nvPicPr>
@@ -26134,7 +26162,7 @@
       </p:pic>
       <p:sp>
         <p:nvSpPr>
-          <p:cNvPr id="264" name="Google Shape;264;p47"/>
+          <p:cNvPr id="265" name="Google Shape;265;p47"/>
           <p:cNvSpPr txBox="1"/>
           <p:nvPr>
             <p:ph type="title"/>
@@ -26182,7 +26210,7 @@
       </p:sp>
       <p:sp>
         <p:nvSpPr>
-          <p:cNvPr id="265" name="Google Shape;265;p47"/>
+          <p:cNvPr id="266" name="Google Shape;266;p47"/>
           <p:cNvSpPr txBox="1"/>
           <p:nvPr>
             <p:ph idx="4294967295" type="body"/>
@@ -26276,7 +26304,7 @@
       </p:sp>
       <p:sp>
         <p:nvSpPr>
-          <p:cNvPr id="266" name="Google Shape;266;p47"/>
+          <p:cNvPr id="267" name="Google Shape;267;p47"/>
           <p:cNvSpPr txBox="1"/>
           <p:nvPr>
             <p:ph idx="12" type="sldNum"/>
@@ -26324,7 +26352,7 @@
       </p:sp>
       <p:sp>
         <p:nvSpPr>
-          <p:cNvPr id="267" name="Google Shape;267;p47"/>
+          <p:cNvPr id="268" name="Google Shape;268;p47"/>
           <p:cNvSpPr txBox="1"/>
           <p:nvPr/>
         </p:nvSpPr>
@@ -26376,7 +26404,7 @@
       </p:sp>
       <p:pic>
         <p:nvPicPr>
-          <p:cNvPr id="268" name="Google Shape;268;p47"/>
+          <p:cNvPr id="269" name="Google Shape;269;p47"/>
           <p:cNvPicPr preferRelativeResize="0"/>
           <p:nvPr/>
         </p:nvPicPr>
@@ -26415,7 +26443,7 @@
   <p:cSld>
     <p:spTree>
       <p:nvGrpSpPr>
-        <p:cNvPr id="272" name="Shape 272"/>
+        <p:cNvPr id="273" name="Shape 273"/>
         <p:cNvGrpSpPr/>
         <p:nvPr/>
       </p:nvGrpSpPr>
@@ -26429,7 +26457,7 @@
       </p:grpSpPr>
       <p:pic>
         <p:nvPicPr>
-          <p:cNvPr id="273" name="Google Shape;273;p48"/>
+          <p:cNvPr id="274" name="Google Shape;274;p48"/>
           <p:cNvPicPr preferRelativeResize="0"/>
           <p:nvPr/>
         </p:nvPicPr>
@@ -26457,7 +26485,7 @@
       </p:pic>
       <p:sp>
         <p:nvSpPr>
-          <p:cNvPr id="274" name="Google Shape;274;p48"/>
+          <p:cNvPr id="275" name="Google Shape;275;p48"/>
           <p:cNvSpPr txBox="1"/>
           <p:nvPr>
             <p:ph type="title"/>
@@ -26505,7 +26533,7 @@
       </p:sp>
       <p:sp>
         <p:nvSpPr>
-          <p:cNvPr id="275" name="Google Shape;275;p48"/>
+          <p:cNvPr id="276" name="Google Shape;276;p48"/>
           <p:cNvSpPr txBox="1"/>
           <p:nvPr>
             <p:ph idx="4294967295" type="body"/>
@@ -26603,7 +26631,7 @@
       </p:sp>
       <p:sp>
         <p:nvSpPr>
-          <p:cNvPr id="276" name="Google Shape;276;p48"/>
+          <p:cNvPr id="277" name="Google Shape;277;p48"/>
           <p:cNvSpPr txBox="1"/>
           <p:nvPr>
             <p:ph idx="12" type="sldNum"/>
@@ -26651,7 +26679,7 @@
       </p:sp>
       <p:sp>
         <p:nvSpPr>
-          <p:cNvPr id="277" name="Google Shape;277;p48"/>
+          <p:cNvPr id="278" name="Google Shape;278;p48"/>
           <p:cNvSpPr txBox="1"/>
           <p:nvPr/>
         </p:nvSpPr>
@@ -26703,7 +26731,7 @@
       </p:sp>
       <p:pic>
         <p:nvPicPr>
-          <p:cNvPr id="278" name="Google Shape;278;p48"/>
+          <p:cNvPr id="279" name="Google Shape;279;p48"/>
           <p:cNvPicPr preferRelativeResize="0"/>
           <p:nvPr/>
         </p:nvPicPr>
@@ -26742,7 +26770,7 @@
   <p:cSld>
     <p:spTree>
       <p:nvGrpSpPr>
-        <p:cNvPr id="282" name="Shape 282"/>
+        <p:cNvPr id="283" name="Shape 283"/>
         <p:cNvGrpSpPr/>
         <p:nvPr/>
       </p:nvGrpSpPr>
@@ -26756,7 +26784,7 @@
       </p:grpSpPr>
       <p:pic>
         <p:nvPicPr>
-          <p:cNvPr id="283" name="Google Shape;283;p49"/>
+          <p:cNvPr id="284" name="Google Shape;284;p49"/>
           <p:cNvPicPr preferRelativeResize="0"/>
           <p:nvPr/>
         </p:nvPicPr>
@@ -26784,7 +26812,7 @@
       </p:pic>
       <p:sp>
         <p:nvSpPr>
-          <p:cNvPr id="284" name="Google Shape;284;p49"/>
+          <p:cNvPr id="285" name="Google Shape;285;p49"/>
           <p:cNvSpPr txBox="1"/>
           <p:nvPr>
             <p:ph type="title"/>
@@ -26832,7 +26860,7 @@
       </p:sp>
       <p:sp>
         <p:nvSpPr>
-          <p:cNvPr id="285" name="Google Shape;285;p49"/>
+          <p:cNvPr id="286" name="Google Shape;286;p49"/>
           <p:cNvSpPr txBox="1"/>
           <p:nvPr>
             <p:ph idx="4294967295" type="body"/>
@@ -26939,7 +26967,7 @@
       </p:sp>
       <p:sp>
         <p:nvSpPr>
-          <p:cNvPr id="286" name="Google Shape;286;p49"/>
+          <p:cNvPr id="287" name="Google Shape;287;p49"/>
           <p:cNvSpPr txBox="1"/>
           <p:nvPr>
             <p:ph idx="12" type="sldNum"/>
@@ -26987,7 +27015,7 @@
       </p:sp>
       <p:sp>
         <p:nvSpPr>
-          <p:cNvPr id="287" name="Google Shape;287;p49"/>
+          <p:cNvPr id="288" name="Google Shape;288;p49"/>
           <p:cNvSpPr txBox="1"/>
           <p:nvPr/>
         </p:nvSpPr>
@@ -27039,7 +27067,7 @@
       </p:sp>
       <p:pic>
         <p:nvPicPr>
-          <p:cNvPr id="288" name="Google Shape;288;p49"/>
+          <p:cNvPr id="289" name="Google Shape;289;p49"/>
           <p:cNvPicPr preferRelativeResize="0"/>
           <p:nvPr/>
         </p:nvPicPr>
@@ -27078,7 +27106,7 @@
   <p:cSld>
     <p:spTree>
       <p:nvGrpSpPr>
-        <p:cNvPr id="292" name="Shape 292"/>
+        <p:cNvPr id="293" name="Shape 293"/>
         <p:cNvGrpSpPr/>
         <p:nvPr/>
       </p:nvGrpSpPr>
@@ -27092,7 +27120,7 @@
       </p:grpSpPr>
       <p:pic>
         <p:nvPicPr>
-          <p:cNvPr id="293" name="Google Shape;293;p50"/>
+          <p:cNvPr id="294" name="Google Shape;294;p50"/>
           <p:cNvPicPr preferRelativeResize="0"/>
           <p:nvPr/>
         </p:nvPicPr>
@@ -27120,7 +27148,7 @@
       </p:pic>
       <p:sp>
         <p:nvSpPr>
-          <p:cNvPr id="294" name="Google Shape;294;p50"/>
+          <p:cNvPr id="295" name="Google Shape;295;p50"/>
           <p:cNvSpPr txBox="1"/>
           <p:nvPr>
             <p:ph type="title"/>
@@ -27176,7 +27204,7 @@
       </p:sp>
       <p:sp>
         <p:nvSpPr>
-          <p:cNvPr id="295" name="Google Shape;295;p50"/>
+          <p:cNvPr id="296" name="Google Shape;296;p50"/>
           <p:cNvSpPr txBox="1"/>
           <p:nvPr>
             <p:ph idx="4294967295" type="body"/>
@@ -27266,7 +27294,7 @@
       </p:sp>
       <p:sp>
         <p:nvSpPr>
-          <p:cNvPr id="296" name="Google Shape;296;p50"/>
+          <p:cNvPr id="297" name="Google Shape;297;p50"/>
           <p:cNvSpPr txBox="1"/>
           <p:nvPr>
             <p:ph idx="12" type="sldNum"/>
@@ -27314,7 +27342,7 @@
       </p:sp>
       <p:sp>
         <p:nvSpPr>
-          <p:cNvPr id="297" name="Google Shape;297;p50"/>
+          <p:cNvPr id="298" name="Google Shape;298;p50"/>
           <p:cNvSpPr txBox="1"/>
           <p:nvPr/>
         </p:nvSpPr>
@@ -27366,7 +27394,7 @@
       </p:sp>
       <p:pic>
         <p:nvPicPr>
-          <p:cNvPr id="298" name="Google Shape;298;p50"/>
+          <p:cNvPr id="299" name="Google Shape;299;p50"/>
           <p:cNvPicPr preferRelativeResize="0"/>
           <p:nvPr/>
         </p:nvPicPr>
@@ -27405,7 +27433,7 @@
   <p:cSld>
     <p:spTree>
       <p:nvGrpSpPr>
-        <p:cNvPr id="302" name="Shape 302"/>
+        <p:cNvPr id="303" name="Shape 303"/>
         <p:cNvGrpSpPr/>
         <p:nvPr/>
       </p:nvGrpSpPr>
@@ -27419,7 +27447,7 @@
       </p:grpSpPr>
       <p:pic>
         <p:nvPicPr>
-          <p:cNvPr id="303" name="Google Shape;303;p51"/>
+          <p:cNvPr id="304" name="Google Shape;304;p51"/>
           <p:cNvPicPr preferRelativeResize="0"/>
           <p:nvPr/>
         </p:nvPicPr>
@@ -27447,7 +27475,7 @@
       </p:pic>
       <p:sp>
         <p:nvSpPr>
-          <p:cNvPr id="304" name="Google Shape;304;p51"/>
+          <p:cNvPr id="305" name="Google Shape;305;p51"/>
           <p:cNvSpPr txBox="1"/>
           <p:nvPr>
             <p:ph type="title"/>
@@ -27495,7 +27523,7 @@
       </p:sp>
       <p:sp>
         <p:nvSpPr>
-          <p:cNvPr id="305" name="Google Shape;305;p51"/>
+          <p:cNvPr id="306" name="Google Shape;306;p51"/>
           <p:cNvSpPr txBox="1"/>
           <p:nvPr>
             <p:ph idx="4294967295" type="body"/>
@@ -27654,7 +27682,7 @@
       </p:sp>
       <p:sp>
         <p:nvSpPr>
-          <p:cNvPr id="306" name="Google Shape;306;p51"/>
+          <p:cNvPr id="307" name="Google Shape;307;p51"/>
           <p:cNvSpPr txBox="1"/>
           <p:nvPr>
             <p:ph idx="12" type="sldNum"/>
@@ -27702,7 +27730,7 @@
       </p:sp>
       <p:pic>
         <p:nvPicPr>
-          <p:cNvPr id="307" name="Google Shape;307;p51"/>
+          <p:cNvPr id="308" name="Google Shape;308;p51"/>
           <p:cNvPicPr preferRelativeResize="0"/>
           <p:nvPr/>
         </p:nvPicPr>
@@ -27730,7 +27758,7 @@
       </p:pic>
       <p:pic>
         <p:nvPicPr>
-          <p:cNvPr id="308" name="Google Shape;308;p51"/>
+          <p:cNvPr id="309" name="Google Shape;309;p51"/>
           <p:cNvPicPr preferRelativeResize="0"/>
           <p:nvPr/>
         </p:nvPicPr>
@@ -27758,7 +27786,7 @@
       </p:pic>
       <p:sp>
         <p:nvSpPr>
-          <p:cNvPr id="309" name="Google Shape;309;p51"/>
+          <p:cNvPr id="310" name="Google Shape;310;p51"/>
           <p:cNvSpPr txBox="1"/>
           <p:nvPr/>
         </p:nvSpPr>
@@ -27821,7 +27849,7 @@
   <p:cSld>
     <p:spTree>
       <p:nvGrpSpPr>
-        <p:cNvPr id="313" name="Shape 313"/>
+        <p:cNvPr id="314" name="Shape 314"/>
         <p:cNvGrpSpPr/>
         <p:nvPr/>
       </p:nvGrpSpPr>
@@ -27835,7 +27863,7 @@
       </p:grpSpPr>
       <p:pic>
         <p:nvPicPr>
-          <p:cNvPr id="314" name="Google Shape;314;p52"/>
+          <p:cNvPr id="315" name="Google Shape;315;p52"/>
           <p:cNvPicPr preferRelativeResize="0"/>
           <p:nvPr/>
         </p:nvPicPr>
@@ -27863,7 +27891,7 @@
       </p:pic>
       <p:sp>
         <p:nvSpPr>
-          <p:cNvPr id="315" name="Google Shape;315;p52"/>
+          <p:cNvPr id="316" name="Google Shape;316;p52"/>
           <p:cNvSpPr txBox="1"/>
           <p:nvPr>
             <p:ph type="title"/>
@@ -27911,7 +27939,7 @@
       </p:sp>
       <p:sp>
         <p:nvSpPr>
-          <p:cNvPr id="316" name="Google Shape;316;p52"/>
+          <p:cNvPr id="317" name="Google Shape;317;p52"/>
           <p:cNvSpPr txBox="1"/>
           <p:nvPr>
             <p:ph idx="4294967295" type="body"/>
@@ -28003,7 +28031,7 @@
       </p:sp>
       <p:sp>
         <p:nvSpPr>
-          <p:cNvPr id="317" name="Google Shape;317;p52"/>
+          <p:cNvPr id="318" name="Google Shape;318;p52"/>
           <p:cNvSpPr txBox="1"/>
           <p:nvPr>
             <p:ph idx="12" type="sldNum"/>
@@ -28051,7 +28079,7 @@
       </p:sp>
       <p:sp>
         <p:nvSpPr>
-          <p:cNvPr id="318" name="Google Shape;318;p52"/>
+          <p:cNvPr id="319" name="Google Shape;319;p52"/>
           <p:cNvSpPr txBox="1"/>
           <p:nvPr/>
         </p:nvSpPr>
@@ -28103,7 +28131,7 @@
       </p:sp>
       <p:pic>
         <p:nvPicPr>
-          <p:cNvPr id="319" name="Google Shape;319;p52"/>
+          <p:cNvPr id="320" name="Google Shape;320;p52"/>
           <p:cNvPicPr preferRelativeResize="0"/>
           <p:nvPr/>
         </p:nvPicPr>
@@ -28142,7 +28170,7 @@
   <p:cSld>
     <p:spTree>
       <p:nvGrpSpPr>
-        <p:cNvPr id="323" name="Shape 323"/>
+        <p:cNvPr id="324" name="Shape 324"/>
         <p:cNvGrpSpPr/>
         <p:nvPr/>
       </p:nvGrpSpPr>
@@ -28156,7 +28184,7 @@
       </p:grpSpPr>
       <p:pic>
         <p:nvPicPr>
-          <p:cNvPr id="324" name="Google Shape;324;p53"/>
+          <p:cNvPr id="325" name="Google Shape;325;p53"/>
           <p:cNvPicPr preferRelativeResize="0"/>
           <p:nvPr/>
         </p:nvPicPr>
@@ -28184,7 +28212,7 @@
       </p:pic>
       <p:sp>
         <p:nvSpPr>
-          <p:cNvPr id="325" name="Google Shape;325;p53"/>
+          <p:cNvPr id="326" name="Google Shape;326;p53"/>
           <p:cNvSpPr txBox="1"/>
           <p:nvPr>
             <p:ph type="title"/>
@@ -28248,7 +28276,7 @@
       </p:sp>
       <p:sp>
         <p:nvSpPr>
-          <p:cNvPr id="326" name="Google Shape;326;p53"/>
+          <p:cNvPr id="327" name="Google Shape;327;p53"/>
           <p:cNvSpPr txBox="1"/>
           <p:nvPr>
             <p:ph idx="4294967295" type="body"/>
@@ -28289,7 +28317,7 @@
       </p:sp>
       <p:sp>
         <p:nvSpPr>
-          <p:cNvPr id="327" name="Google Shape;327;p53"/>
+          <p:cNvPr id="328" name="Google Shape;328;p53"/>
           <p:cNvSpPr txBox="1"/>
           <p:nvPr>
             <p:ph idx="12" type="sldNum"/>
@@ -28337,7 +28365,7 @@
       </p:sp>
       <p:sp>
         <p:nvSpPr>
-          <p:cNvPr id="328" name="Google Shape;328;p53"/>
+          <p:cNvPr id="329" name="Google Shape;329;p53"/>
           <p:cNvSpPr txBox="1"/>
           <p:nvPr/>
         </p:nvSpPr>
@@ -28407,7 +28435,7 @@
       </p:sp>
       <p:pic>
         <p:nvPicPr>
-          <p:cNvPr id="329" name="Google Shape;329;p53"/>
+          <p:cNvPr id="330" name="Google Shape;330;p53"/>
           <p:cNvPicPr preferRelativeResize="0"/>
           <p:nvPr/>
         </p:nvPicPr>
@@ -28446,7 +28474,7 @@
   <p:cSld>
     <p:spTree>
       <p:nvGrpSpPr>
-        <p:cNvPr id="333" name="Shape 333"/>
+        <p:cNvPr id="334" name="Shape 334"/>
         <p:cNvGrpSpPr/>
         <p:nvPr/>
       </p:nvGrpSpPr>
@@ -28460,7 +28488,7 @@
       </p:grpSpPr>
       <p:pic>
         <p:nvPicPr>
-          <p:cNvPr id="334" name="Google Shape;334;p54"/>
+          <p:cNvPr id="335" name="Google Shape;335;p54"/>
           <p:cNvPicPr preferRelativeResize="0"/>
           <p:nvPr/>
         </p:nvPicPr>
@@ -28488,7 +28516,7 @@
       </p:pic>
       <p:sp>
         <p:nvSpPr>
-          <p:cNvPr id="335" name="Google Shape;335;p54"/>
+          <p:cNvPr id="336" name="Google Shape;336;p54"/>
           <p:cNvSpPr txBox="1"/>
           <p:nvPr>
             <p:ph type="title"/>
@@ -28536,7 +28564,7 @@
       </p:sp>
       <p:sp>
         <p:nvSpPr>
-          <p:cNvPr id="336" name="Google Shape;336;p54"/>
+          <p:cNvPr id="337" name="Google Shape;337;p54"/>
           <p:cNvSpPr txBox="1"/>
           <p:nvPr>
             <p:ph idx="4294967295" type="body"/>
@@ -28611,7 +28639,7 @@
       </p:sp>
       <p:sp>
         <p:nvSpPr>
-          <p:cNvPr id="337" name="Google Shape;337;p54"/>
+          <p:cNvPr id="338" name="Google Shape;338;p54"/>
           <p:cNvSpPr txBox="1"/>
           <p:nvPr>
             <p:ph idx="12" type="sldNum"/>
@@ -28659,7 +28687,7 @@
       </p:sp>
       <p:sp>
         <p:nvSpPr>
-          <p:cNvPr id="338" name="Google Shape;338;p54"/>
+          <p:cNvPr id="339" name="Google Shape;339;p54"/>
           <p:cNvSpPr txBox="1"/>
           <p:nvPr/>
         </p:nvSpPr>
@@ -28711,7 +28739,7 @@
       </p:sp>
       <p:pic>
         <p:nvPicPr>
-          <p:cNvPr id="339" name="Google Shape;339;p54"/>
+          <p:cNvPr id="340" name="Google Shape;340;p54"/>
           <p:cNvPicPr preferRelativeResize="0"/>
           <p:nvPr/>
         </p:nvPicPr>
@@ -28750,7 +28778,7 @@
   <p:cSld>
     <p:spTree>
       <p:nvGrpSpPr>
-        <p:cNvPr id="343" name="Shape 343"/>
+        <p:cNvPr id="344" name="Shape 344"/>
         <p:cNvGrpSpPr/>
         <p:nvPr/>
       </p:nvGrpSpPr>
@@ -28764,7 +28792,7 @@
       </p:grpSpPr>
       <p:pic>
         <p:nvPicPr>
-          <p:cNvPr id="344" name="Google Shape;344;p55"/>
+          <p:cNvPr id="345" name="Google Shape;345;p55"/>
           <p:cNvPicPr preferRelativeResize="0"/>
           <p:nvPr/>
         </p:nvPicPr>
@@ -28792,7 +28820,7 @@
       </p:pic>
       <p:sp>
         <p:nvSpPr>
-          <p:cNvPr id="345" name="Google Shape;345;p55"/>
+          <p:cNvPr id="346" name="Google Shape;346;p55"/>
           <p:cNvSpPr txBox="1"/>
           <p:nvPr>
             <p:ph type="title"/>
@@ -28840,7 +28868,7 @@
       </p:sp>
       <p:sp>
         <p:nvSpPr>
-          <p:cNvPr id="346" name="Google Shape;346;p55"/>
+          <p:cNvPr id="347" name="Google Shape;347;p55"/>
           <p:cNvSpPr txBox="1"/>
           <p:nvPr>
             <p:ph idx="4294967295" type="body"/>
@@ -28919,7 +28947,7 @@
       </p:sp>
       <p:sp>
         <p:nvSpPr>
-          <p:cNvPr id="347" name="Google Shape;347;p55"/>
+          <p:cNvPr id="348" name="Google Shape;348;p55"/>
           <p:cNvSpPr txBox="1"/>
           <p:nvPr>
             <p:ph idx="12" type="sldNum"/>
@@ -28967,7 +28995,7 @@
       </p:sp>
       <p:sp>
         <p:nvSpPr>
-          <p:cNvPr id="348" name="Google Shape;348;p55"/>
+          <p:cNvPr id="349" name="Google Shape;349;p55"/>
           <p:cNvSpPr txBox="1"/>
           <p:nvPr/>
         </p:nvSpPr>
@@ -29019,7 +29047,7 @@
       </p:sp>
       <p:pic>
         <p:nvPicPr>
-          <p:cNvPr id="349" name="Google Shape;349;p55"/>
+          <p:cNvPr id="350" name="Google Shape;350;p55"/>
           <p:cNvPicPr preferRelativeResize="0"/>
           <p:nvPr/>
         </p:nvPicPr>
@@ -29058,7 +29086,7 @@
   <p:cSld>
     <p:spTree>
       <p:nvGrpSpPr>
-        <p:cNvPr id="182" name="Shape 182"/>
+        <p:cNvPr id="183" name="Shape 183"/>
         <p:cNvGrpSpPr/>
         <p:nvPr/>
       </p:nvGrpSpPr>
@@ -29072,7 +29100,7 @@
       </p:grpSpPr>
       <p:pic>
         <p:nvPicPr>
-          <p:cNvPr id="183" name="Google Shape;183;p38"/>
+          <p:cNvPr id="184" name="Google Shape;184;p38"/>
           <p:cNvPicPr preferRelativeResize="0"/>
           <p:nvPr/>
         </p:nvPicPr>
@@ -29099,7 +29127,7 @@
       </p:pic>
       <p:sp>
         <p:nvSpPr>
-          <p:cNvPr id="184" name="Google Shape;184;p38"/>
+          <p:cNvPr id="185" name="Google Shape;185;p38"/>
           <p:cNvSpPr txBox="1"/>
           <p:nvPr>
             <p:ph type="title"/>
@@ -29147,7 +29175,7 @@
       </p:sp>
       <p:sp>
         <p:nvSpPr>
-          <p:cNvPr id="185" name="Google Shape;185;p38"/>
+          <p:cNvPr id="186" name="Google Shape;186;p38"/>
           <p:cNvSpPr txBox="1"/>
           <p:nvPr/>
         </p:nvSpPr>
@@ -29311,7 +29339,7 @@
       </p:sp>
       <p:sp>
         <p:nvSpPr>
-          <p:cNvPr id="186" name="Google Shape;186;p38"/>
+          <p:cNvPr id="187" name="Google Shape;187;p38"/>
           <p:cNvSpPr txBox="1"/>
           <p:nvPr>
             <p:ph idx="12" type="sldNum"/>
@@ -29359,7 +29387,7 @@
       </p:sp>
       <p:pic>
         <p:nvPicPr>
-          <p:cNvPr id="187" name="Google Shape;187;p38"/>
+          <p:cNvPr id="188" name="Google Shape;188;p38"/>
           <p:cNvPicPr preferRelativeResize="0"/>
           <p:nvPr/>
         </p:nvPicPr>
@@ -29397,7 +29425,7 @@
   <p:cSld>
     <p:spTree>
       <p:nvGrpSpPr>
-        <p:cNvPr id="353" name="Shape 353"/>
+        <p:cNvPr id="354" name="Shape 354"/>
         <p:cNvGrpSpPr/>
         <p:nvPr/>
       </p:nvGrpSpPr>
@@ -29411,7 +29439,7 @@
       </p:grpSpPr>
       <p:pic>
         <p:nvPicPr>
-          <p:cNvPr id="354" name="Google Shape;354;p56"/>
+          <p:cNvPr id="355" name="Google Shape;355;p56"/>
           <p:cNvPicPr preferRelativeResize="0"/>
           <p:nvPr/>
         </p:nvPicPr>
@@ -29439,7 +29467,7 @@
       </p:pic>
       <p:sp>
         <p:nvSpPr>
-          <p:cNvPr id="355" name="Google Shape;355;p56"/>
+          <p:cNvPr id="356" name="Google Shape;356;p56"/>
           <p:cNvSpPr txBox="1"/>
           <p:nvPr>
             <p:ph type="title"/>
@@ -29503,7 +29531,7 @@
       </p:sp>
       <p:sp>
         <p:nvSpPr>
-          <p:cNvPr id="356" name="Google Shape;356;p56"/>
+          <p:cNvPr id="357" name="Google Shape;357;p56"/>
           <p:cNvSpPr txBox="1"/>
           <p:nvPr>
             <p:ph idx="4294967295" type="body"/>
@@ -29686,7 +29714,7 @@
       </p:sp>
       <p:sp>
         <p:nvSpPr>
-          <p:cNvPr id="357" name="Google Shape;357;p56"/>
+          <p:cNvPr id="358" name="Google Shape;358;p56"/>
           <p:cNvSpPr txBox="1"/>
           <p:nvPr>
             <p:ph idx="12" type="sldNum"/>
@@ -29745,7 +29773,7 @@
   <p:cSld>
     <p:spTree>
       <p:nvGrpSpPr>
-        <p:cNvPr id="361" name="Shape 361"/>
+        <p:cNvPr id="362" name="Shape 362"/>
         <p:cNvGrpSpPr/>
         <p:nvPr/>
       </p:nvGrpSpPr>
@@ -29759,7 +29787,7 @@
       </p:grpSpPr>
       <p:pic>
         <p:nvPicPr>
-          <p:cNvPr id="362" name="Google Shape;362;p57"/>
+          <p:cNvPr id="363" name="Google Shape;363;p57"/>
           <p:cNvPicPr preferRelativeResize="0"/>
           <p:nvPr/>
         </p:nvPicPr>
@@ -29787,7 +29815,7 @@
       </p:pic>
       <p:sp>
         <p:nvSpPr>
-          <p:cNvPr id="363" name="Google Shape;363;p57"/>
+          <p:cNvPr id="364" name="Google Shape;364;p57"/>
           <p:cNvSpPr txBox="1"/>
           <p:nvPr>
             <p:ph type="title"/>
@@ -29854,7 +29882,7 @@
       </p:sp>
       <p:sp>
         <p:nvSpPr>
-          <p:cNvPr id="364" name="Google Shape;364;p57"/>
+          <p:cNvPr id="365" name="Google Shape;365;p57"/>
           <p:cNvSpPr txBox="1"/>
           <p:nvPr>
             <p:ph idx="4294967295" type="body"/>
@@ -29958,7 +29986,7 @@
       </p:sp>
       <p:sp>
         <p:nvSpPr>
-          <p:cNvPr id="365" name="Google Shape;365;p57"/>
+          <p:cNvPr id="366" name="Google Shape;366;p57"/>
           <p:cNvSpPr txBox="1"/>
           <p:nvPr>
             <p:ph idx="12" type="sldNum"/>
@@ -30017,7 +30045,7 @@
   <p:cSld>
     <p:spTree>
       <p:nvGrpSpPr>
-        <p:cNvPr id="369" name="Shape 369"/>
+        <p:cNvPr id="370" name="Shape 370"/>
         <p:cNvGrpSpPr/>
         <p:nvPr/>
       </p:nvGrpSpPr>
@@ -30031,7 +30059,7 @@
       </p:grpSpPr>
       <p:pic>
         <p:nvPicPr>
-          <p:cNvPr id="370" name="Google Shape;370;p58"/>
+          <p:cNvPr id="371" name="Google Shape;371;p58"/>
           <p:cNvPicPr preferRelativeResize="0"/>
           <p:nvPr/>
         </p:nvPicPr>
@@ -30059,7 +30087,7 @@
       </p:pic>
       <p:sp>
         <p:nvSpPr>
-          <p:cNvPr id="371" name="Google Shape;371;p58"/>
+          <p:cNvPr id="372" name="Google Shape;372;p58"/>
           <p:cNvSpPr txBox="1"/>
           <p:nvPr>
             <p:ph type="title"/>
@@ -30142,7 +30170,7 @@
       </p:sp>
       <p:sp>
         <p:nvSpPr>
-          <p:cNvPr id="372" name="Google Shape;372;p58"/>
+          <p:cNvPr id="373" name="Google Shape;373;p58"/>
           <p:cNvSpPr txBox="1"/>
           <p:nvPr>
             <p:ph idx="4294967295" type="body"/>
@@ -30257,7 +30285,7 @@
       </p:sp>
       <p:sp>
         <p:nvSpPr>
-          <p:cNvPr id="373" name="Google Shape;373;p58"/>
+          <p:cNvPr id="374" name="Google Shape;374;p58"/>
           <p:cNvSpPr txBox="1"/>
           <p:nvPr>
             <p:ph idx="12" type="sldNum"/>
@@ -30316,7 +30344,7 @@
   <p:cSld>
     <p:spTree>
       <p:nvGrpSpPr>
-        <p:cNvPr id="377" name="Shape 377"/>
+        <p:cNvPr id="378" name="Shape 378"/>
         <p:cNvGrpSpPr/>
         <p:nvPr/>
       </p:nvGrpSpPr>
@@ -30330,7 +30358,7 @@
       </p:grpSpPr>
       <p:pic>
         <p:nvPicPr>
-          <p:cNvPr id="378" name="Google Shape;378;p59"/>
+          <p:cNvPr id="379" name="Google Shape;379;p59"/>
           <p:cNvPicPr preferRelativeResize="0"/>
           <p:nvPr/>
         </p:nvPicPr>
@@ -30358,7 +30386,7 @@
       </p:pic>
       <p:sp>
         <p:nvSpPr>
-          <p:cNvPr id="379" name="Google Shape;379;p59"/>
+          <p:cNvPr id="380" name="Google Shape;380;p59"/>
           <p:cNvSpPr txBox="1"/>
           <p:nvPr>
             <p:ph type="title"/>
@@ -30425,7 +30453,7 @@
       </p:sp>
       <p:sp>
         <p:nvSpPr>
-          <p:cNvPr id="380" name="Google Shape;380;p59"/>
+          <p:cNvPr id="381" name="Google Shape;381;p59"/>
           <p:cNvSpPr txBox="1"/>
           <p:nvPr>
             <p:ph idx="4294967295" type="body"/>
@@ -30483,7 +30511,7 @@
       </p:sp>
       <p:sp>
         <p:nvSpPr>
-          <p:cNvPr id="381" name="Google Shape;381;p59"/>
+          <p:cNvPr id="382" name="Google Shape;382;p59"/>
           <p:cNvSpPr txBox="1"/>
           <p:nvPr>
             <p:ph idx="12" type="sldNum"/>
@@ -30531,7 +30559,7 @@
       </p:sp>
       <p:pic>
         <p:nvPicPr>
-          <p:cNvPr id="382" name="Google Shape;382;p59"/>
+          <p:cNvPr id="383" name="Google Shape;383;p59"/>
           <p:cNvPicPr preferRelativeResize="0"/>
           <p:nvPr/>
         </p:nvPicPr>
@@ -30559,7 +30587,7 @@
       </p:pic>
       <p:sp>
         <p:nvSpPr>
-          <p:cNvPr id="383" name="Google Shape;383;p59"/>
+          <p:cNvPr id="384" name="Google Shape;384;p59"/>
           <p:cNvSpPr txBox="1"/>
           <p:nvPr>
             <p:ph idx="4294967295" type="body"/>
@@ -30617,7 +30645,7 @@
       </p:sp>
       <p:sp>
         <p:nvSpPr>
-          <p:cNvPr id="384" name="Google Shape;384;p59"/>
+          <p:cNvPr id="385" name="Google Shape;385;p59"/>
           <p:cNvSpPr txBox="1"/>
           <p:nvPr/>
         </p:nvSpPr>
@@ -30680,7 +30708,7 @@
   <p:cSld>
     <p:spTree>
       <p:nvGrpSpPr>
-        <p:cNvPr id="388" name="Shape 388"/>
+        <p:cNvPr id="389" name="Shape 389"/>
         <p:cNvGrpSpPr/>
         <p:nvPr/>
       </p:nvGrpSpPr>
@@ -30694,7 +30722,7 @@
       </p:grpSpPr>
       <p:pic>
         <p:nvPicPr>
-          <p:cNvPr id="389" name="Google Shape;389;p60"/>
+          <p:cNvPr id="390" name="Google Shape;390;p60"/>
           <p:cNvPicPr preferRelativeResize="0"/>
           <p:nvPr/>
         </p:nvPicPr>
@@ -30722,7 +30750,7 @@
       </p:pic>
       <p:sp>
         <p:nvSpPr>
-          <p:cNvPr id="390" name="Google Shape;390;p60"/>
+          <p:cNvPr id="391" name="Google Shape;391;p60"/>
           <p:cNvSpPr txBox="1"/>
           <p:nvPr>
             <p:ph type="title"/>
@@ -30789,7 +30817,7 @@
       </p:sp>
       <p:sp>
         <p:nvSpPr>
-          <p:cNvPr id="391" name="Google Shape;391;p60"/>
+          <p:cNvPr id="392" name="Google Shape;392;p60"/>
           <p:cNvSpPr txBox="1"/>
           <p:nvPr>
             <p:ph idx="4294967295" type="body"/>
@@ -30872,7 +30900,7 @@
       </p:sp>
       <p:sp>
         <p:nvSpPr>
-          <p:cNvPr id="392" name="Google Shape;392;p60"/>
+          <p:cNvPr id="393" name="Google Shape;393;p60"/>
           <p:cNvSpPr txBox="1"/>
           <p:nvPr>
             <p:ph idx="12" type="sldNum"/>
@@ -30920,7 +30948,7 @@
       </p:sp>
       <p:sp>
         <p:nvSpPr>
-          <p:cNvPr id="393" name="Google Shape;393;p60"/>
+          <p:cNvPr id="394" name="Google Shape;394;p60"/>
           <p:cNvSpPr txBox="1"/>
           <p:nvPr/>
         </p:nvSpPr>
@@ -30972,7 +31000,7 @@
       </p:sp>
       <p:pic>
         <p:nvPicPr>
-          <p:cNvPr id="394" name="Google Shape;394;p60"/>
+          <p:cNvPr id="395" name="Google Shape;395;p60"/>
           <p:cNvPicPr preferRelativeResize="0"/>
           <p:nvPr/>
         </p:nvPicPr>
@@ -31011,7 +31039,7 @@
   <p:cSld>
     <p:spTree>
       <p:nvGrpSpPr>
-        <p:cNvPr id="398" name="Shape 398"/>
+        <p:cNvPr id="399" name="Shape 399"/>
         <p:cNvGrpSpPr/>
         <p:nvPr/>
       </p:nvGrpSpPr>
@@ -31025,7 +31053,7 @@
       </p:grpSpPr>
       <p:pic>
         <p:nvPicPr>
-          <p:cNvPr id="399" name="Google Shape;399;p61"/>
+          <p:cNvPr id="400" name="Google Shape;400;p61"/>
           <p:cNvPicPr preferRelativeResize="0"/>
           <p:nvPr/>
         </p:nvPicPr>
@@ -31053,7 +31081,7 @@
       </p:pic>
       <p:sp>
         <p:nvSpPr>
-          <p:cNvPr id="400" name="Google Shape;400;p61"/>
+          <p:cNvPr id="401" name="Google Shape;401;p61"/>
           <p:cNvSpPr txBox="1"/>
           <p:nvPr>
             <p:ph type="title"/>
@@ -31120,7 +31148,7 @@
       </p:sp>
       <p:sp>
         <p:nvSpPr>
-          <p:cNvPr id="401" name="Google Shape;401;p61"/>
+          <p:cNvPr id="402" name="Google Shape;402;p61"/>
           <p:cNvSpPr txBox="1"/>
           <p:nvPr>
             <p:ph idx="4294967295" type="body"/>
@@ -31216,7 +31244,7 @@
       </p:sp>
       <p:sp>
         <p:nvSpPr>
-          <p:cNvPr id="402" name="Google Shape;402;p61"/>
+          <p:cNvPr id="403" name="Google Shape;403;p61"/>
           <p:cNvSpPr txBox="1"/>
           <p:nvPr>
             <p:ph idx="12" type="sldNum"/>
@@ -31264,7 +31292,7 @@
       </p:sp>
       <p:sp>
         <p:nvSpPr>
-          <p:cNvPr id="403" name="Google Shape;403;p61"/>
+          <p:cNvPr id="404" name="Google Shape;404;p61"/>
           <p:cNvSpPr txBox="1"/>
           <p:nvPr/>
         </p:nvSpPr>
@@ -31316,7 +31344,7 @@
       </p:sp>
       <p:pic>
         <p:nvPicPr>
-          <p:cNvPr id="404" name="Google Shape;404;p61"/>
+          <p:cNvPr id="405" name="Google Shape;405;p61"/>
           <p:cNvPicPr preferRelativeResize="0"/>
           <p:nvPr/>
         </p:nvPicPr>
@@ -31355,7 +31383,7 @@
   <p:cSld>
     <p:spTree>
       <p:nvGrpSpPr>
-        <p:cNvPr id="408" name="Shape 408"/>
+        <p:cNvPr id="409" name="Shape 409"/>
         <p:cNvGrpSpPr/>
         <p:nvPr/>
       </p:nvGrpSpPr>
@@ -31369,7 +31397,7 @@
       </p:grpSpPr>
       <p:pic>
         <p:nvPicPr>
-          <p:cNvPr id="409" name="Google Shape;409;p62"/>
+          <p:cNvPr id="410" name="Google Shape;410;p62"/>
           <p:cNvPicPr preferRelativeResize="0"/>
           <p:nvPr/>
         </p:nvPicPr>
@@ -31397,7 +31425,7 @@
       </p:pic>
       <p:sp>
         <p:nvSpPr>
-          <p:cNvPr id="410" name="Google Shape;410;p62"/>
+          <p:cNvPr id="411" name="Google Shape;411;p62"/>
           <p:cNvSpPr txBox="1"/>
           <p:nvPr>
             <p:ph type="title"/>
@@ -31464,7 +31492,7 @@
       </p:sp>
       <p:sp>
         <p:nvSpPr>
-          <p:cNvPr id="411" name="Google Shape;411;p62"/>
+          <p:cNvPr id="412" name="Google Shape;412;p62"/>
           <p:cNvSpPr txBox="1"/>
           <p:nvPr>
             <p:ph idx="4294967295" type="body"/>
@@ -31554,7 +31582,7 @@
       </p:sp>
       <p:sp>
         <p:nvSpPr>
-          <p:cNvPr id="412" name="Google Shape;412;p62"/>
+          <p:cNvPr id="413" name="Google Shape;413;p62"/>
           <p:cNvSpPr txBox="1"/>
           <p:nvPr>
             <p:ph idx="12" type="sldNum"/>
@@ -31613,7 +31641,7 @@
   <p:cSld>
     <p:spTree>
       <p:nvGrpSpPr>
-        <p:cNvPr id="416" name="Shape 416"/>
+        <p:cNvPr id="417" name="Shape 417"/>
         <p:cNvGrpSpPr/>
         <p:nvPr/>
       </p:nvGrpSpPr>
@@ -31627,7 +31655,7 @@
       </p:grpSpPr>
       <p:pic>
         <p:nvPicPr>
-          <p:cNvPr id="417" name="Google Shape;417;p63"/>
+          <p:cNvPr id="418" name="Google Shape;418;p63"/>
           <p:cNvPicPr preferRelativeResize="0"/>
           <p:nvPr/>
         </p:nvPicPr>
@@ -31655,7 +31683,7 @@
       </p:pic>
       <p:sp>
         <p:nvSpPr>
-          <p:cNvPr id="418" name="Google Shape;418;p63"/>
+          <p:cNvPr id="419" name="Google Shape;419;p63"/>
           <p:cNvSpPr txBox="1"/>
           <p:nvPr>
             <p:ph type="title"/>
@@ -31722,7 +31750,7 @@
       </p:sp>
       <p:sp>
         <p:nvSpPr>
-          <p:cNvPr id="419" name="Google Shape;419;p63"/>
+          <p:cNvPr id="420" name="Google Shape;420;p63"/>
           <p:cNvSpPr txBox="1"/>
           <p:nvPr>
             <p:ph idx="4294967295" type="body"/>
@@ -31882,7 +31910,7 @@
       </p:sp>
       <p:sp>
         <p:nvSpPr>
-          <p:cNvPr id="420" name="Google Shape;420;p63"/>
+          <p:cNvPr id="421" name="Google Shape;421;p63"/>
           <p:cNvSpPr txBox="1"/>
           <p:nvPr>
             <p:ph idx="12" type="sldNum"/>
@@ -31930,7 +31958,7 @@
       </p:sp>
       <p:pic>
         <p:nvPicPr>
-          <p:cNvPr id="421" name="Google Shape;421;p63"/>
+          <p:cNvPr id="422" name="Google Shape;422;p63"/>
           <p:cNvPicPr preferRelativeResize="0"/>
           <p:nvPr/>
         </p:nvPicPr>
@@ -31969,7 +31997,7 @@
   <p:cSld>
     <p:spTree>
       <p:nvGrpSpPr>
-        <p:cNvPr id="425" name="Shape 425"/>
+        <p:cNvPr id="426" name="Shape 426"/>
         <p:cNvGrpSpPr/>
         <p:nvPr/>
       </p:nvGrpSpPr>
@@ -31983,7 +32011,7 @@
       </p:grpSpPr>
       <p:pic>
         <p:nvPicPr>
-          <p:cNvPr id="426" name="Google Shape;426;p64"/>
+          <p:cNvPr id="427" name="Google Shape;427;p64"/>
           <p:cNvPicPr preferRelativeResize="0"/>
           <p:nvPr/>
         </p:nvPicPr>
@@ -32011,7 +32039,7 @@
       </p:pic>
       <p:sp>
         <p:nvSpPr>
-          <p:cNvPr id="427" name="Google Shape;427;p64"/>
+          <p:cNvPr id="428" name="Google Shape;428;p64"/>
           <p:cNvSpPr txBox="1"/>
           <p:nvPr>
             <p:ph type="title"/>
@@ -32059,7 +32087,7 @@
       </p:sp>
       <p:sp>
         <p:nvSpPr>
-          <p:cNvPr id="428" name="Google Shape;428;p64"/>
+          <p:cNvPr id="429" name="Google Shape;429;p64"/>
           <p:cNvSpPr txBox="1"/>
           <p:nvPr>
             <p:ph idx="12" type="sldNum"/>
@@ -32107,7 +32135,7 @@
       </p:sp>
       <p:sp>
         <p:nvSpPr>
-          <p:cNvPr id="429" name="Google Shape;429;p64"/>
+          <p:cNvPr id="430" name="Google Shape;430;p64"/>
           <p:cNvSpPr txBox="1"/>
           <p:nvPr/>
         </p:nvSpPr>
@@ -32170,7 +32198,7 @@
       </p:sp>
       <p:sp>
         <p:nvSpPr>
-          <p:cNvPr id="430" name="Google Shape;430;p64"/>
+          <p:cNvPr id="431" name="Google Shape;431;p64"/>
           <p:cNvSpPr txBox="1"/>
           <p:nvPr/>
         </p:nvSpPr>
@@ -32211,7 +32239,7 @@
       </p:sp>
       <p:sp>
         <p:nvSpPr>
-          <p:cNvPr id="431" name="Google Shape;431;p64"/>
+          <p:cNvPr id="432" name="Google Shape;432;p64"/>
           <p:cNvSpPr txBox="1"/>
           <p:nvPr/>
         </p:nvSpPr>
@@ -32305,7 +32333,7 @@
       </p:sp>
       <p:sp>
         <p:nvSpPr>
-          <p:cNvPr id="432" name="Google Shape;432;p64"/>
+          <p:cNvPr id="433" name="Google Shape;433;p64"/>
           <p:cNvSpPr txBox="1"/>
           <p:nvPr/>
         </p:nvSpPr>
@@ -32359,7 +32387,7 @@
       </p:sp>
       <p:sp>
         <p:nvSpPr>
-          <p:cNvPr id="433" name="Google Shape;433;p64"/>
+          <p:cNvPr id="434" name="Google Shape;434;p64"/>
           <p:cNvSpPr txBox="1"/>
           <p:nvPr/>
         </p:nvSpPr>
@@ -32453,7 +32481,7 @@
       </p:sp>
       <p:sp>
         <p:nvSpPr>
-          <p:cNvPr id="434" name="Google Shape;434;p64"/>
+          <p:cNvPr id="435" name="Google Shape;435;p64"/>
           <p:cNvSpPr txBox="1"/>
           <p:nvPr/>
         </p:nvSpPr>
@@ -32525,7 +32553,7 @@
       </p:sp>
       <p:sp>
         <p:nvSpPr>
-          <p:cNvPr id="435" name="Google Shape;435;p64"/>
+          <p:cNvPr id="436" name="Google Shape;436;p64"/>
           <p:cNvSpPr txBox="1"/>
           <p:nvPr/>
         </p:nvSpPr>
@@ -32619,7 +32647,7 @@
       </p:sp>
       <p:sp>
         <p:nvSpPr>
-          <p:cNvPr id="436" name="Google Shape;436;p64"/>
+          <p:cNvPr id="437" name="Google Shape;437;p64"/>
           <p:cNvSpPr txBox="1"/>
           <p:nvPr/>
         </p:nvSpPr>
@@ -32661,7 +32689,7 @@
       </p:sp>
       <p:sp>
         <p:nvSpPr>
-          <p:cNvPr id="437" name="Google Shape;437;p64"/>
+          <p:cNvPr id="438" name="Google Shape;438;p64"/>
           <p:cNvSpPr txBox="1"/>
           <p:nvPr/>
         </p:nvSpPr>
@@ -32703,7 +32731,7 @@
       </p:sp>
       <p:sp>
         <p:nvSpPr>
-          <p:cNvPr id="438" name="Google Shape;438;p64"/>
+          <p:cNvPr id="439" name="Google Shape;439;p64"/>
           <p:cNvSpPr txBox="1"/>
           <p:nvPr/>
         </p:nvSpPr>
@@ -32756,59 +32784,6 @@
             <p:seq concurrent="1" nextAc="seek">
               <p:cTn dur="indefinite" id="2" nodeType="mainSeq">
                 <p:childTnLst>
-                  <p:par>
-                    <p:cTn fill="hold">
-                      <p:stCondLst>
-                        <p:cond delay="indefinite"/>
-                      </p:stCondLst>
-                      <p:childTnLst>
-                        <p:par>
-                          <p:cTn fill="hold">
-                            <p:stCondLst>
-                              <p:cond delay="0"/>
-                            </p:stCondLst>
-                            <p:childTnLst>
-                              <p:par>
-                                <p:cTn fill="hold" nodeType="clickEffect" presetClass="entr" presetID="10" presetSubtype="0">
-                                  <p:stCondLst>
-                                    <p:cond delay="0"/>
-                                  </p:stCondLst>
-                                  <p:childTnLst>
-                                    <p:set>
-                                      <p:cBhvr>
-                                        <p:cTn dur="1" fill="hold">
-                                          <p:stCondLst>
-                                            <p:cond delay="0"/>
-                                          </p:stCondLst>
-                                        </p:cTn>
-                                        <p:tgtEl>
-                                          <p:spTgt spid="436"/>
-                                        </p:tgtEl>
-                                        <p:attrNameLst>
-                                          <p:attrName>style.visibility</p:attrName>
-                                        </p:attrNameLst>
-                                      </p:cBhvr>
-                                      <p:to>
-                                        <p:strVal val="visible"/>
-                                      </p:to>
-                                    </p:set>
-                                    <p:animEffect filter="fade" transition="in">
-                                      <p:cBhvr>
-                                        <p:cTn dur="1000"/>
-                                        <p:tgtEl>
-                                          <p:spTgt spid="436"/>
-                                        </p:tgtEl>
-                                      </p:cBhvr>
-                                    </p:animEffect>
-                                  </p:childTnLst>
-                                </p:cTn>
-                              </p:par>
-                            </p:childTnLst>
-                          </p:cTn>
-                        </p:par>
-                      </p:childTnLst>
-                    </p:cTn>
-                  </p:par>
                   <p:par>
                     <p:cTn fill="hold">
                       <p:stCondLst>
@@ -32915,6 +32890,59 @@
                       </p:childTnLst>
                     </p:cTn>
                   </p:par>
+                  <p:par>
+                    <p:cTn fill="hold">
+                      <p:stCondLst>
+                        <p:cond delay="indefinite"/>
+                      </p:stCondLst>
+                      <p:childTnLst>
+                        <p:par>
+                          <p:cTn fill="hold">
+                            <p:stCondLst>
+                              <p:cond delay="0"/>
+                            </p:stCondLst>
+                            <p:childTnLst>
+                              <p:par>
+                                <p:cTn fill="hold" nodeType="clickEffect" presetClass="entr" presetID="10" presetSubtype="0">
+                                  <p:stCondLst>
+                                    <p:cond delay="0"/>
+                                  </p:stCondLst>
+                                  <p:childTnLst>
+                                    <p:set>
+                                      <p:cBhvr>
+                                        <p:cTn dur="1" fill="hold">
+                                          <p:stCondLst>
+                                            <p:cond delay="0"/>
+                                          </p:stCondLst>
+                                        </p:cTn>
+                                        <p:tgtEl>
+                                          <p:spTgt spid="439"/>
+                                        </p:tgtEl>
+                                        <p:attrNameLst>
+                                          <p:attrName>style.visibility</p:attrName>
+                                        </p:attrNameLst>
+                                      </p:cBhvr>
+                                      <p:to>
+                                        <p:strVal val="visible"/>
+                                      </p:to>
+                                    </p:set>
+                                    <p:animEffect filter="fade" transition="in">
+                                      <p:cBhvr>
+                                        <p:cTn dur="1000"/>
+                                        <p:tgtEl>
+                                          <p:spTgt spid="439"/>
+                                        </p:tgtEl>
+                                      </p:cBhvr>
+                                    </p:animEffect>
+                                  </p:childTnLst>
+                                </p:cTn>
+                              </p:par>
+                            </p:childTnLst>
+                          </p:cTn>
+                        </p:par>
+                      </p:childTnLst>
+                    </p:cTn>
+                  </p:par>
                 </p:childTnLst>
               </p:cTn>
               <p:prevCondLst>
@@ -32945,7 +32973,7 @@
   <p:cSld>
     <p:spTree>
       <p:nvGrpSpPr>
-        <p:cNvPr id="442" name="Shape 442"/>
+        <p:cNvPr id="443" name="Shape 443"/>
         <p:cNvGrpSpPr/>
         <p:nvPr/>
       </p:nvGrpSpPr>
@@ -32959,7 +32987,7 @@
       </p:grpSpPr>
       <p:pic>
         <p:nvPicPr>
-          <p:cNvPr id="443" name="Google Shape;443;p65"/>
+          <p:cNvPr id="444" name="Google Shape;444;p65"/>
           <p:cNvPicPr preferRelativeResize="0"/>
           <p:nvPr/>
         </p:nvPicPr>
@@ -32987,7 +33015,7 @@
       </p:pic>
       <p:sp>
         <p:nvSpPr>
-          <p:cNvPr id="444" name="Google Shape;444;p65"/>
+          <p:cNvPr id="445" name="Google Shape;445;p65"/>
           <p:cNvSpPr txBox="1"/>
           <p:nvPr>
             <p:ph type="title"/>
@@ -33035,7 +33063,7 @@
       </p:sp>
       <p:sp>
         <p:nvSpPr>
-          <p:cNvPr id="445" name="Google Shape;445;p65"/>
+          <p:cNvPr id="446" name="Google Shape;446;p65"/>
           <p:cNvSpPr txBox="1"/>
           <p:nvPr/>
         </p:nvSpPr>
@@ -33185,7 +33213,7 @@
       </p:sp>
       <p:sp>
         <p:nvSpPr>
-          <p:cNvPr id="446" name="Google Shape;446;p65"/>
+          <p:cNvPr id="447" name="Google Shape;447;p65"/>
           <p:cNvSpPr txBox="1"/>
           <p:nvPr>
             <p:ph idx="12" type="sldNum"/>
@@ -33244,7 +33272,7 @@
   <p:cSld>
     <p:spTree>
       <p:nvGrpSpPr>
-        <p:cNvPr id="191" name="Shape 191"/>
+        <p:cNvPr id="192" name="Shape 192"/>
         <p:cNvGrpSpPr/>
         <p:nvPr/>
       </p:nvGrpSpPr>
@@ -33258,7 +33286,7 @@
       </p:grpSpPr>
       <p:pic>
         <p:nvPicPr>
-          <p:cNvPr id="192" name="Google Shape;192;p39"/>
+          <p:cNvPr id="193" name="Google Shape;193;p39"/>
           <p:cNvPicPr preferRelativeResize="0"/>
           <p:nvPr/>
         </p:nvPicPr>
@@ -33285,7 +33313,7 @@
       </p:pic>
       <p:sp>
         <p:nvSpPr>
-          <p:cNvPr id="193" name="Google Shape;193;p39"/>
+          <p:cNvPr id="194" name="Google Shape;194;p39"/>
           <p:cNvSpPr txBox="1"/>
           <p:nvPr>
             <p:ph type="title"/>
@@ -33333,7 +33361,7 @@
       </p:sp>
       <p:sp>
         <p:nvSpPr>
-          <p:cNvPr id="194" name="Google Shape;194;p39"/>
+          <p:cNvPr id="195" name="Google Shape;195;p39"/>
           <p:cNvSpPr txBox="1"/>
           <p:nvPr/>
         </p:nvSpPr>
@@ -33608,7 +33636,7 @@
       </p:sp>
       <p:sp>
         <p:nvSpPr>
-          <p:cNvPr id="195" name="Google Shape;195;p39"/>
+          <p:cNvPr id="196" name="Google Shape;196;p39"/>
           <p:cNvSpPr txBox="1"/>
           <p:nvPr>
             <p:ph idx="12" type="sldNum"/>
@@ -33667,7 +33695,7 @@
   <p:cSld>
     <p:spTree>
       <p:nvGrpSpPr>
-        <p:cNvPr id="199" name="Shape 199"/>
+        <p:cNvPr id="200" name="Shape 200"/>
         <p:cNvGrpSpPr/>
         <p:nvPr/>
       </p:nvGrpSpPr>
@@ -33681,7 +33709,7 @@
       </p:grpSpPr>
       <p:pic>
         <p:nvPicPr>
-          <p:cNvPr id="200" name="Google Shape;200;p40"/>
+          <p:cNvPr id="201" name="Google Shape;201;p40"/>
           <p:cNvPicPr preferRelativeResize="0"/>
           <p:nvPr/>
         </p:nvPicPr>
@@ -33708,7 +33736,7 @@
       </p:pic>
       <p:sp>
         <p:nvSpPr>
-          <p:cNvPr id="201" name="Google Shape;201;p40"/>
+          <p:cNvPr id="202" name="Google Shape;202;p40"/>
           <p:cNvSpPr txBox="1"/>
           <p:nvPr>
             <p:ph type="title"/>
@@ -33756,7 +33784,7 @@
       </p:sp>
       <p:sp>
         <p:nvSpPr>
-          <p:cNvPr id="202" name="Google Shape;202;p40"/>
+          <p:cNvPr id="203" name="Google Shape;203;p40"/>
           <p:cNvSpPr txBox="1"/>
           <p:nvPr/>
         </p:nvSpPr>
@@ -33920,7 +33948,7 @@
       </p:sp>
       <p:sp>
         <p:nvSpPr>
-          <p:cNvPr id="203" name="Google Shape;203;p40"/>
+          <p:cNvPr id="204" name="Google Shape;204;p40"/>
           <p:cNvSpPr txBox="1"/>
           <p:nvPr>
             <p:ph idx="12" type="sldNum"/>
@@ -33968,7 +33996,7 @@
       </p:sp>
       <p:pic>
         <p:nvPicPr>
-          <p:cNvPr id="204" name="Google Shape;204;p40"/>
+          <p:cNvPr id="205" name="Google Shape;205;p40"/>
           <p:cNvPicPr preferRelativeResize="0"/>
           <p:nvPr/>
         </p:nvPicPr>
@@ -34006,7 +34034,7 @@
   <p:cSld>
     <p:spTree>
       <p:nvGrpSpPr>
-        <p:cNvPr id="208" name="Shape 208"/>
+        <p:cNvPr id="209" name="Shape 209"/>
         <p:cNvGrpSpPr/>
         <p:nvPr/>
       </p:nvGrpSpPr>
@@ -34020,7 +34048,7 @@
       </p:grpSpPr>
       <p:pic>
         <p:nvPicPr>
-          <p:cNvPr id="209" name="Google Shape;209;p41"/>
+          <p:cNvPr id="210" name="Google Shape;210;p41"/>
           <p:cNvPicPr preferRelativeResize="0"/>
           <p:nvPr/>
         </p:nvPicPr>
@@ -34048,7 +34076,7 @@
       </p:pic>
       <p:sp>
         <p:nvSpPr>
-          <p:cNvPr id="210" name="Google Shape;210;p41"/>
+          <p:cNvPr id="211" name="Google Shape;211;p41"/>
           <p:cNvSpPr txBox="1"/>
           <p:nvPr>
             <p:ph type="title"/>
@@ -34096,7 +34124,7 @@
       </p:sp>
       <p:sp>
         <p:nvSpPr>
-          <p:cNvPr id="211" name="Google Shape;211;p41"/>
+          <p:cNvPr id="212" name="Google Shape;212;p41"/>
           <p:cNvSpPr txBox="1"/>
           <p:nvPr>
             <p:ph idx="4294967295" type="body"/>
@@ -34186,7 +34214,7 @@
       </p:sp>
       <p:sp>
         <p:nvSpPr>
-          <p:cNvPr id="212" name="Google Shape;212;p41"/>
+          <p:cNvPr id="213" name="Google Shape;213;p41"/>
           <p:cNvSpPr txBox="1"/>
           <p:nvPr>
             <p:ph idx="12" type="sldNum"/>
@@ -34245,7 +34273,7 @@
   <p:cSld>
     <p:spTree>
       <p:nvGrpSpPr>
-        <p:cNvPr id="216" name="Shape 216"/>
+        <p:cNvPr id="217" name="Shape 217"/>
         <p:cNvGrpSpPr/>
         <p:nvPr/>
       </p:nvGrpSpPr>
@@ -34259,7 +34287,7 @@
       </p:grpSpPr>
       <p:pic>
         <p:nvPicPr>
-          <p:cNvPr id="217" name="Google Shape;217;p42"/>
+          <p:cNvPr id="218" name="Google Shape;218;p42"/>
           <p:cNvPicPr preferRelativeResize="0"/>
           <p:nvPr/>
         </p:nvPicPr>
@@ -34287,7 +34315,7 @@
       </p:pic>
       <p:sp>
         <p:nvSpPr>
-          <p:cNvPr id="218" name="Google Shape;218;p42"/>
+          <p:cNvPr id="219" name="Google Shape;219;p42"/>
           <p:cNvSpPr txBox="1"/>
           <p:nvPr>
             <p:ph type="title"/>
@@ -34351,7 +34379,7 @@
       </p:sp>
       <p:sp>
         <p:nvSpPr>
-          <p:cNvPr id="219" name="Google Shape;219;p42"/>
+          <p:cNvPr id="220" name="Google Shape;220;p42"/>
           <p:cNvSpPr txBox="1"/>
           <p:nvPr>
             <p:ph idx="4294967295" type="body"/>
@@ -34500,7 +34528,7 @@
       </p:sp>
       <p:sp>
         <p:nvSpPr>
-          <p:cNvPr id="220" name="Google Shape;220;p42"/>
+          <p:cNvPr id="221" name="Google Shape;221;p42"/>
           <p:cNvSpPr txBox="1"/>
           <p:nvPr>
             <p:ph idx="12" type="sldNum"/>
@@ -34559,7 +34587,7 @@
   <p:cSld>
     <p:spTree>
       <p:nvGrpSpPr>
-        <p:cNvPr id="224" name="Shape 224"/>
+        <p:cNvPr id="225" name="Shape 225"/>
         <p:cNvGrpSpPr/>
         <p:nvPr/>
       </p:nvGrpSpPr>
@@ -34573,7 +34601,7 @@
       </p:grpSpPr>
       <p:pic>
         <p:nvPicPr>
-          <p:cNvPr id="225" name="Google Shape;225;p43"/>
+          <p:cNvPr id="226" name="Google Shape;226;p43"/>
           <p:cNvPicPr preferRelativeResize="0"/>
           <p:nvPr/>
         </p:nvPicPr>
@@ -34601,7 +34629,7 @@
       </p:pic>
       <p:sp>
         <p:nvSpPr>
-          <p:cNvPr id="226" name="Google Shape;226;p43"/>
+          <p:cNvPr id="227" name="Google Shape;227;p43"/>
           <p:cNvSpPr txBox="1"/>
           <p:nvPr>
             <p:ph type="title"/>
@@ -34649,7 +34677,7 @@
       </p:sp>
       <p:sp>
         <p:nvSpPr>
-          <p:cNvPr id="227" name="Google Shape;227;p43"/>
+          <p:cNvPr id="228" name="Google Shape;228;p43"/>
           <p:cNvSpPr txBox="1"/>
           <p:nvPr>
             <p:ph idx="4294967295" type="body"/>
@@ -34758,7 +34786,7 @@
       </p:sp>
       <p:sp>
         <p:nvSpPr>
-          <p:cNvPr id="228" name="Google Shape;228;p43"/>
+          <p:cNvPr id="229" name="Google Shape;229;p43"/>
           <p:cNvSpPr txBox="1"/>
           <p:nvPr>
             <p:ph idx="12" type="sldNum"/>
@@ -34806,7 +34834,7 @@
       </p:sp>
       <p:pic>
         <p:nvPicPr>
-          <p:cNvPr id="229" name="Google Shape;229;p43"/>
+          <p:cNvPr id="230" name="Google Shape;230;p43"/>
           <p:cNvPicPr preferRelativeResize="0"/>
           <p:nvPr/>
         </p:nvPicPr>
@@ -34834,7 +34862,7 @@
       </p:pic>
       <p:sp>
         <p:nvSpPr>
-          <p:cNvPr id="230" name="Google Shape;230;p43"/>
+          <p:cNvPr id="231" name="Google Shape;231;p43"/>
           <p:cNvSpPr txBox="1"/>
           <p:nvPr/>
         </p:nvSpPr>
@@ -34897,7 +34925,7 @@
   <p:cSld>
     <p:spTree>
       <p:nvGrpSpPr>
-        <p:cNvPr id="234" name="Shape 234"/>
+        <p:cNvPr id="235" name="Shape 235"/>
         <p:cNvGrpSpPr/>
         <p:nvPr/>
       </p:nvGrpSpPr>
@@ -34911,7 +34939,7 @@
       </p:grpSpPr>
       <p:pic>
         <p:nvPicPr>
-          <p:cNvPr id="235" name="Google Shape;235;p44"/>
+          <p:cNvPr id="236" name="Google Shape;236;p44"/>
           <p:cNvPicPr preferRelativeResize="0"/>
           <p:nvPr/>
         </p:nvPicPr>
@@ -34939,7 +34967,7 @@
       </p:pic>
       <p:sp>
         <p:nvSpPr>
-          <p:cNvPr id="236" name="Google Shape;236;p44"/>
+          <p:cNvPr id="237" name="Google Shape;237;p44"/>
           <p:cNvSpPr txBox="1"/>
           <p:nvPr>
             <p:ph type="title"/>
@@ -34987,7 +35015,7 @@
       </p:sp>
       <p:sp>
         <p:nvSpPr>
-          <p:cNvPr id="237" name="Google Shape;237;p44"/>
+          <p:cNvPr id="238" name="Google Shape;238;p44"/>
           <p:cNvSpPr txBox="1"/>
           <p:nvPr>
             <p:ph idx="4294967295" type="body"/>
@@ -35154,7 +35182,7 @@
       </p:sp>
       <p:sp>
         <p:nvSpPr>
-          <p:cNvPr id="238" name="Google Shape;238;p44"/>
+          <p:cNvPr id="239" name="Google Shape;239;p44"/>
           <p:cNvSpPr txBox="1"/>
           <p:nvPr>
             <p:ph idx="12" type="sldNum"/>
@@ -35213,7 +35241,7 @@
   <p:cSld>
     <p:spTree>
       <p:nvGrpSpPr>
-        <p:cNvPr id="242" name="Shape 242"/>
+        <p:cNvPr id="243" name="Shape 243"/>
         <p:cNvGrpSpPr/>
         <p:nvPr/>
       </p:nvGrpSpPr>
@@ -35227,7 +35255,7 @@
       </p:grpSpPr>
       <p:pic>
         <p:nvPicPr>
-          <p:cNvPr id="243" name="Google Shape;243;p45"/>
+          <p:cNvPr id="244" name="Google Shape;244;p45"/>
           <p:cNvPicPr preferRelativeResize="0"/>
           <p:nvPr/>
         </p:nvPicPr>
@@ -35255,7 +35283,7 @@
       </p:pic>
       <p:sp>
         <p:nvSpPr>
-          <p:cNvPr id="244" name="Google Shape;244;p45"/>
+          <p:cNvPr id="245" name="Google Shape;245;p45"/>
           <p:cNvSpPr txBox="1"/>
           <p:nvPr>
             <p:ph type="title"/>
@@ -35303,7 +35331,7 @@
       </p:sp>
       <p:sp>
         <p:nvSpPr>
-          <p:cNvPr id="245" name="Google Shape;245;p45"/>
+          <p:cNvPr id="246" name="Google Shape;246;p45"/>
           <p:cNvSpPr txBox="1"/>
           <p:nvPr>
             <p:ph idx="4294967295" type="body"/>
@@ -35378,7 +35406,7 @@
       </p:sp>
       <p:sp>
         <p:nvSpPr>
-          <p:cNvPr id="246" name="Google Shape;246;p45"/>
+          <p:cNvPr id="247" name="Google Shape;247;p45"/>
           <p:cNvSpPr txBox="1"/>
           <p:nvPr>
             <p:ph idx="12" type="sldNum"/>
@@ -35426,7 +35454,7 @@
       </p:sp>
       <p:sp>
         <p:nvSpPr>
-          <p:cNvPr id="247" name="Google Shape;247;p45"/>
+          <p:cNvPr id="248" name="Google Shape;248;p45"/>
           <p:cNvSpPr txBox="1"/>
           <p:nvPr/>
         </p:nvSpPr>
@@ -35478,7 +35506,7 @@
       </p:sp>
       <p:pic>
         <p:nvPicPr>
-          <p:cNvPr id="248" name="Google Shape;248;p45"/>
+          <p:cNvPr id="249" name="Google Shape;249;p45"/>
           <p:cNvPicPr preferRelativeResize="0"/>
           <p:nvPr/>
         </p:nvPicPr>
@@ -35513,6 +35541,564 @@
 </file>
 
 <file path=ppt/theme/theme1.xml><?xml version="1.0" encoding="utf-8"?>
+<a:theme xmlns:a="http://schemas.openxmlformats.org/drawingml/2006/main" xmlns:r="http://schemas.openxmlformats.org/officeDocument/2006/relationships" name="Simple Light">
+  <a:themeElements>
+    <a:clrScheme name="Simple Light">
+      <a:dk1>
+        <a:srgbClr val="000000"/>
+      </a:dk1>
+      <a:lt1>
+        <a:srgbClr val="FFFFFF"/>
+      </a:lt1>
+      <a:dk2>
+        <a:srgbClr val="595959"/>
+      </a:dk2>
+      <a:lt2>
+        <a:srgbClr val="EEEEEE"/>
+      </a:lt2>
+      <a:accent1>
+        <a:srgbClr val="4285F4"/>
+      </a:accent1>
+      <a:accent2>
+        <a:srgbClr val="212121"/>
+      </a:accent2>
+      <a:accent3>
+        <a:srgbClr val="78909C"/>
+      </a:accent3>
+      <a:accent4>
+        <a:srgbClr val="FFAB40"/>
+      </a:accent4>
+      <a:accent5>
+        <a:srgbClr val="0097A7"/>
+      </a:accent5>
+      <a:accent6>
+        <a:srgbClr val="EEFF41"/>
+      </a:accent6>
+      <a:hlink>
+        <a:srgbClr val="0097A7"/>
+      </a:hlink>
+      <a:folHlink>
+        <a:srgbClr val="0097A7"/>
+      </a:folHlink>
+    </a:clrScheme>
+    <a:fontScheme name="Office">
+      <a:majorFont>
+        <a:latin typeface="Arial"/>
+        <a:ea typeface=""/>
+        <a:cs typeface=""/>
+        <a:font script="Jpan" typeface="ＭＳ Ｐゴシック"/>
+        <a:font script="Hang" typeface="맑은 고딕"/>
+        <a:font script="Hans" typeface="宋体"/>
+        <a:font script="Hant" typeface="新細明體"/>
+        <a:font script="Arab" typeface="Times New Roman"/>
+        <a:font script="Hebr" typeface="Times New Roman"/>
+        <a:font script="Thai" typeface="Angsana New"/>
+        <a:font script="Ethi" typeface="Nyala"/>
+        <a:font script="Beng" typeface="Vrinda"/>
+        <a:font script="Gujr" typeface="Shruti"/>
+        <a:font script="Khmr" typeface="MoolBoran"/>
+        <a:font script="Knda" typeface="Tunga"/>
+        <a:font script="Guru" typeface="Raavi"/>
+        <a:font script="Cans" typeface="Euphemia"/>
+        <a:font script="Cher" typeface="Plantagenet Cherokee"/>
+        <a:font script="Yiii" typeface="Microsoft Yi Baiti"/>
+        <a:font script="Tibt" typeface="Microsoft Himalaya"/>
+        <a:font script="Thaa" typeface="MV Boli"/>
+        <a:font script="Deva" typeface="Mangal"/>
+        <a:font script="Telu" typeface="Gautami"/>
+        <a:font script="Taml" typeface="Latha"/>
+        <a:font script="Syrc" typeface="Estrangelo Edessa"/>
+        <a:font script="Orya" typeface="Kalinga"/>
+        <a:font script="Mlym" typeface="Kartika"/>
+        <a:font script="Laoo" typeface="DokChampa"/>
+        <a:font script="Sinh" typeface="Iskoola Pota"/>
+        <a:font script="Mong" typeface="Mongolian Baiti"/>
+        <a:font script="Viet" typeface="Times New Roman"/>
+        <a:font script="Uigh" typeface="Microsoft Uighur"/>
+        <a:font script="Geor" typeface="Sylfaen"/>
+      </a:majorFont>
+      <a:minorFont>
+        <a:latin typeface="Arial"/>
+        <a:ea typeface=""/>
+        <a:cs typeface=""/>
+        <a:font script="Jpan" typeface="ＭＳ Ｐゴシック"/>
+        <a:font script="Hang" typeface="맑은 고딕"/>
+        <a:font script="Hans" typeface="宋体"/>
+        <a:font script="Hant" typeface="新細明體"/>
+        <a:font script="Arab" typeface="Arial"/>
+        <a:font script="Hebr" typeface="Arial"/>
+        <a:font script="Thai" typeface="Cordia New"/>
+        <a:font script="Ethi" typeface="Nyala"/>
+        <a:font script="Beng" typeface="Vrinda"/>
+        <a:font script="Gujr" typeface="Shruti"/>
+        <a:font script="Khmr" typeface="DaunPenh"/>
+        <a:font script="Knda" typeface="Tunga"/>
+        <a:font script="Guru" typeface="Raavi"/>
+        <a:font script="Cans" typeface="Euphemia"/>
+        <a:font script="Cher" typeface="Plantagenet Cherokee"/>
+        <a:font script="Yiii" typeface="Microsoft Yi Baiti"/>
+        <a:font script="Tibt" typeface="Microsoft Himalaya"/>
+        <a:font script="Thaa" typeface="MV Boli"/>
+        <a:font script="Deva" typeface="Mangal"/>
+        <a:font script="Telu" typeface="Gautami"/>
+        <a:font script="Taml" typeface="Latha"/>
+        <a:font script="Syrc" typeface="Estrangelo Edessa"/>
+        <a:font script="Orya" typeface="Kalinga"/>
+        <a:font script="Mlym" typeface="Kartika"/>
+        <a:font script="Laoo" typeface="DokChampa"/>
+        <a:font script="Sinh" typeface="Iskoola Pota"/>
+        <a:font script="Mong" typeface="Mongolian Baiti"/>
+        <a:font script="Viet" typeface="Arial"/>
+        <a:font script="Uigh" typeface="Microsoft Uighur"/>
+        <a:font script="Geor" typeface="Sylfaen"/>
+      </a:minorFont>
+    </a:fontScheme>
+    <a:fmtScheme name="Office">
+      <a:fillStyleLst>
+        <a:solidFill>
+          <a:schemeClr val="phClr"/>
+        </a:solidFill>
+        <a:gradFill rotWithShape="1">
+          <a:gsLst>
+            <a:gs pos="0">
+              <a:schemeClr val="phClr">
+                <a:tint val="50000"/>
+                <a:satMod val="300000"/>
+              </a:schemeClr>
+            </a:gs>
+            <a:gs pos="35000">
+              <a:schemeClr val="phClr">
+                <a:tint val="37000"/>
+                <a:satMod val="300000"/>
+              </a:schemeClr>
+            </a:gs>
+            <a:gs pos="100000">
+              <a:schemeClr val="phClr">
+                <a:tint val="15000"/>
+                <a:satMod val="350000"/>
+              </a:schemeClr>
+            </a:gs>
+          </a:gsLst>
+          <a:lin ang="16200000" scaled="1"/>
+        </a:gradFill>
+        <a:gradFill rotWithShape="1">
+          <a:gsLst>
+            <a:gs pos="0">
+              <a:schemeClr val="phClr">
+                <a:tint val="100000"/>
+                <a:shade val="100000"/>
+                <a:satMod val="130000"/>
+              </a:schemeClr>
+            </a:gs>
+            <a:gs pos="100000">
+              <a:schemeClr val="phClr">
+                <a:tint val="50000"/>
+                <a:shade val="100000"/>
+                <a:satMod val="350000"/>
+              </a:schemeClr>
+            </a:gs>
+          </a:gsLst>
+          <a:lin ang="16200000" scaled="0"/>
+        </a:gradFill>
+      </a:fillStyleLst>
+      <a:lnStyleLst>
+        <a:ln w="9525" cap="flat" cmpd="sng" algn="ctr">
+          <a:solidFill>
+            <a:schemeClr val="phClr">
+              <a:shade val="95000"/>
+              <a:satMod val="105000"/>
+            </a:schemeClr>
+          </a:solidFill>
+          <a:prstDash val="solid"/>
+        </a:ln>
+        <a:ln w="25400" cap="flat" cmpd="sng" algn="ctr">
+          <a:solidFill>
+            <a:schemeClr val="phClr"/>
+          </a:solidFill>
+          <a:prstDash val="solid"/>
+        </a:ln>
+        <a:ln w="38100" cap="flat" cmpd="sng" algn="ctr">
+          <a:solidFill>
+            <a:schemeClr val="phClr"/>
+          </a:solidFill>
+          <a:prstDash val="solid"/>
+        </a:ln>
+      </a:lnStyleLst>
+      <a:effectStyleLst>
+        <a:effectStyle>
+          <a:effectLst>
+            <a:outerShdw blurRad="40000" dist="20000" dir="5400000" rotWithShape="0">
+              <a:srgbClr val="000000">
+                <a:alpha val="38000"/>
+              </a:srgbClr>
+            </a:outerShdw>
+          </a:effectLst>
+        </a:effectStyle>
+        <a:effectStyle>
+          <a:effectLst>
+            <a:outerShdw blurRad="40000" dist="23000" dir="5400000" rotWithShape="0">
+              <a:srgbClr val="000000">
+                <a:alpha val="35000"/>
+              </a:srgbClr>
+            </a:outerShdw>
+          </a:effectLst>
+        </a:effectStyle>
+        <a:effectStyle>
+          <a:effectLst>
+            <a:outerShdw blurRad="40000" dist="23000" dir="5400000" rotWithShape="0">
+              <a:srgbClr val="000000">
+                <a:alpha val="35000"/>
+              </a:srgbClr>
+            </a:outerShdw>
+          </a:effectLst>
+          <a:scene3d>
+            <a:camera prst="orthographicFront">
+              <a:rot lat="0" lon="0" rev="0"/>
+            </a:camera>
+            <a:lightRig rig="threePt" dir="t">
+              <a:rot lat="0" lon="0" rev="1200000"/>
+            </a:lightRig>
+          </a:scene3d>
+          <a:sp3d>
+            <a:bevelT w="63500" h="25400"/>
+          </a:sp3d>
+        </a:effectStyle>
+      </a:effectStyleLst>
+      <a:bgFillStyleLst>
+        <a:solidFill>
+          <a:schemeClr val="phClr"/>
+        </a:solidFill>
+        <a:gradFill rotWithShape="1">
+          <a:gsLst>
+            <a:gs pos="0">
+              <a:schemeClr val="phClr">
+                <a:tint val="40000"/>
+                <a:satMod val="350000"/>
+              </a:schemeClr>
+            </a:gs>
+            <a:gs pos="40000">
+              <a:schemeClr val="phClr">
+                <a:tint val="45000"/>
+                <a:shade val="99000"/>
+                <a:satMod val="350000"/>
+              </a:schemeClr>
+            </a:gs>
+            <a:gs pos="100000">
+              <a:schemeClr val="phClr">
+                <a:shade val="20000"/>
+                <a:satMod val="255000"/>
+              </a:schemeClr>
+            </a:gs>
+          </a:gsLst>
+          <a:path path="circle">
+            <a:fillToRect l="50000" t="-80000" r="50000" b="180000"/>
+          </a:path>
+        </a:gradFill>
+        <a:gradFill rotWithShape="1">
+          <a:gsLst>
+            <a:gs pos="0">
+              <a:schemeClr val="phClr">
+                <a:tint val="80000"/>
+                <a:satMod val="300000"/>
+              </a:schemeClr>
+            </a:gs>
+            <a:gs pos="100000">
+              <a:schemeClr val="phClr">
+                <a:shade val="30000"/>
+                <a:satMod val="200000"/>
+              </a:schemeClr>
+            </a:gs>
+          </a:gsLst>
+          <a:path path="circle">
+            <a:fillToRect l="50000" t="50000" r="50000" b="50000"/>
+          </a:path>
+        </a:gradFill>
+      </a:bgFillStyleLst>
+    </a:fmtScheme>
+  </a:themeElements>
+</a:theme>
+</file>
+
+<file path=ppt/theme/theme2.xml><?xml version="1.0" encoding="utf-8"?>
+<a:theme xmlns:a="http://schemas.openxmlformats.org/drawingml/2006/main" xmlns:r="http://schemas.openxmlformats.org/officeDocument/2006/relationships" name="Simple Light">
+  <a:themeElements>
+    <a:clrScheme name="Simple Light">
+      <a:dk1>
+        <a:srgbClr val="000000"/>
+      </a:dk1>
+      <a:lt1>
+        <a:srgbClr val="FFFFFF"/>
+      </a:lt1>
+      <a:dk2>
+        <a:srgbClr val="595959"/>
+      </a:dk2>
+      <a:lt2>
+        <a:srgbClr val="EEEEEE"/>
+      </a:lt2>
+      <a:accent1>
+        <a:srgbClr val="4285F4"/>
+      </a:accent1>
+      <a:accent2>
+        <a:srgbClr val="212121"/>
+      </a:accent2>
+      <a:accent3>
+        <a:srgbClr val="78909C"/>
+      </a:accent3>
+      <a:accent4>
+        <a:srgbClr val="FFAB40"/>
+      </a:accent4>
+      <a:accent5>
+        <a:srgbClr val="0097A7"/>
+      </a:accent5>
+      <a:accent6>
+        <a:srgbClr val="EEFF41"/>
+      </a:accent6>
+      <a:hlink>
+        <a:srgbClr val="0097A7"/>
+      </a:hlink>
+      <a:folHlink>
+        <a:srgbClr val="0097A7"/>
+      </a:folHlink>
+    </a:clrScheme>
+    <a:fontScheme name="Office">
+      <a:majorFont>
+        <a:latin typeface="Arial"/>
+        <a:ea typeface=""/>
+        <a:cs typeface=""/>
+        <a:font script="Jpan" typeface="ＭＳ Ｐゴシック"/>
+        <a:font script="Hang" typeface="맑은 고딕"/>
+        <a:font script="Hans" typeface="宋体"/>
+        <a:font script="Hant" typeface="新細明體"/>
+        <a:font script="Arab" typeface="Times New Roman"/>
+        <a:font script="Hebr" typeface="Times New Roman"/>
+        <a:font script="Thai" typeface="Angsana New"/>
+        <a:font script="Ethi" typeface="Nyala"/>
+        <a:font script="Beng" typeface="Vrinda"/>
+        <a:font script="Gujr" typeface="Shruti"/>
+        <a:font script="Khmr" typeface="MoolBoran"/>
+        <a:font script="Knda" typeface="Tunga"/>
+        <a:font script="Guru" typeface="Raavi"/>
+        <a:font script="Cans" typeface="Euphemia"/>
+        <a:font script="Cher" typeface="Plantagenet Cherokee"/>
+        <a:font script="Yiii" typeface="Microsoft Yi Baiti"/>
+        <a:font script="Tibt" typeface="Microsoft Himalaya"/>
+        <a:font script="Thaa" typeface="MV Boli"/>
+        <a:font script="Deva" typeface="Mangal"/>
+        <a:font script="Telu" typeface="Gautami"/>
+        <a:font script="Taml" typeface="Latha"/>
+        <a:font script="Syrc" typeface="Estrangelo Edessa"/>
+        <a:font script="Orya" typeface="Kalinga"/>
+        <a:font script="Mlym" typeface="Kartika"/>
+        <a:font script="Laoo" typeface="DokChampa"/>
+        <a:font script="Sinh" typeface="Iskoola Pota"/>
+        <a:font script="Mong" typeface="Mongolian Baiti"/>
+        <a:font script="Viet" typeface="Times New Roman"/>
+        <a:font script="Uigh" typeface="Microsoft Uighur"/>
+        <a:font script="Geor" typeface="Sylfaen"/>
+      </a:majorFont>
+      <a:minorFont>
+        <a:latin typeface="Arial"/>
+        <a:ea typeface=""/>
+        <a:cs typeface=""/>
+        <a:font script="Jpan" typeface="ＭＳ Ｐゴシック"/>
+        <a:font script="Hang" typeface="맑은 고딕"/>
+        <a:font script="Hans" typeface="宋体"/>
+        <a:font script="Hant" typeface="新細明體"/>
+        <a:font script="Arab" typeface="Arial"/>
+        <a:font script="Hebr" typeface="Arial"/>
+        <a:font script="Thai" typeface="Cordia New"/>
+        <a:font script="Ethi" typeface="Nyala"/>
+        <a:font script="Beng" typeface="Vrinda"/>
+        <a:font script="Gujr" typeface="Shruti"/>
+        <a:font script="Khmr" typeface="DaunPenh"/>
+        <a:font script="Knda" typeface="Tunga"/>
+        <a:font script="Guru" typeface="Raavi"/>
+        <a:font script="Cans" typeface="Euphemia"/>
+        <a:font script="Cher" typeface="Plantagenet Cherokee"/>
+        <a:font script="Yiii" typeface="Microsoft Yi Baiti"/>
+        <a:font script="Tibt" typeface="Microsoft Himalaya"/>
+        <a:font script="Thaa" typeface="MV Boli"/>
+        <a:font script="Deva" typeface="Mangal"/>
+        <a:font script="Telu" typeface="Gautami"/>
+        <a:font script="Taml" typeface="Latha"/>
+        <a:font script="Syrc" typeface="Estrangelo Edessa"/>
+        <a:font script="Orya" typeface="Kalinga"/>
+        <a:font script="Mlym" typeface="Kartika"/>
+        <a:font script="Laoo" typeface="DokChampa"/>
+        <a:font script="Sinh" typeface="Iskoola Pota"/>
+        <a:font script="Mong" typeface="Mongolian Baiti"/>
+        <a:font script="Viet" typeface="Arial"/>
+        <a:font script="Uigh" typeface="Microsoft Uighur"/>
+        <a:font script="Geor" typeface="Sylfaen"/>
+      </a:minorFont>
+    </a:fontScheme>
+    <a:fmtScheme name="Office">
+      <a:fillStyleLst>
+        <a:solidFill>
+          <a:schemeClr val="phClr"/>
+        </a:solidFill>
+        <a:gradFill rotWithShape="1">
+          <a:gsLst>
+            <a:gs pos="0">
+              <a:schemeClr val="phClr">
+                <a:tint val="50000"/>
+                <a:satMod val="300000"/>
+              </a:schemeClr>
+            </a:gs>
+            <a:gs pos="35000">
+              <a:schemeClr val="phClr">
+                <a:tint val="37000"/>
+                <a:satMod val="300000"/>
+              </a:schemeClr>
+            </a:gs>
+            <a:gs pos="100000">
+              <a:schemeClr val="phClr">
+                <a:tint val="15000"/>
+                <a:satMod val="350000"/>
+              </a:schemeClr>
+            </a:gs>
+          </a:gsLst>
+          <a:lin ang="16200000" scaled="1"/>
+        </a:gradFill>
+        <a:gradFill rotWithShape="1">
+          <a:gsLst>
+            <a:gs pos="0">
+              <a:schemeClr val="phClr">
+                <a:tint val="100000"/>
+                <a:shade val="100000"/>
+                <a:satMod val="130000"/>
+              </a:schemeClr>
+            </a:gs>
+            <a:gs pos="100000">
+              <a:schemeClr val="phClr">
+                <a:tint val="50000"/>
+                <a:shade val="100000"/>
+                <a:satMod val="350000"/>
+              </a:schemeClr>
+            </a:gs>
+          </a:gsLst>
+          <a:lin ang="16200000" scaled="0"/>
+        </a:gradFill>
+      </a:fillStyleLst>
+      <a:lnStyleLst>
+        <a:ln w="9525" cap="flat" cmpd="sng" algn="ctr">
+          <a:solidFill>
+            <a:schemeClr val="phClr">
+              <a:shade val="95000"/>
+              <a:satMod val="105000"/>
+            </a:schemeClr>
+          </a:solidFill>
+          <a:prstDash val="solid"/>
+        </a:ln>
+        <a:ln w="25400" cap="flat" cmpd="sng" algn="ctr">
+          <a:solidFill>
+            <a:schemeClr val="phClr"/>
+          </a:solidFill>
+          <a:prstDash val="solid"/>
+        </a:ln>
+        <a:ln w="38100" cap="flat" cmpd="sng" algn="ctr">
+          <a:solidFill>
+            <a:schemeClr val="phClr"/>
+          </a:solidFill>
+          <a:prstDash val="solid"/>
+        </a:ln>
+      </a:lnStyleLst>
+      <a:effectStyleLst>
+        <a:effectStyle>
+          <a:effectLst>
+            <a:outerShdw blurRad="40000" dist="20000" dir="5400000" rotWithShape="0">
+              <a:srgbClr val="000000">
+                <a:alpha val="38000"/>
+              </a:srgbClr>
+            </a:outerShdw>
+          </a:effectLst>
+        </a:effectStyle>
+        <a:effectStyle>
+          <a:effectLst>
+            <a:outerShdw blurRad="40000" dist="23000" dir="5400000" rotWithShape="0">
+              <a:srgbClr val="000000">
+                <a:alpha val="35000"/>
+              </a:srgbClr>
+            </a:outerShdw>
+          </a:effectLst>
+        </a:effectStyle>
+        <a:effectStyle>
+          <a:effectLst>
+            <a:outerShdw blurRad="40000" dist="23000" dir="5400000" rotWithShape="0">
+              <a:srgbClr val="000000">
+                <a:alpha val="35000"/>
+              </a:srgbClr>
+            </a:outerShdw>
+          </a:effectLst>
+          <a:scene3d>
+            <a:camera prst="orthographicFront">
+              <a:rot lat="0" lon="0" rev="0"/>
+            </a:camera>
+            <a:lightRig rig="threePt" dir="t">
+              <a:rot lat="0" lon="0" rev="1200000"/>
+            </a:lightRig>
+          </a:scene3d>
+          <a:sp3d>
+            <a:bevelT w="63500" h="25400"/>
+          </a:sp3d>
+        </a:effectStyle>
+      </a:effectStyleLst>
+      <a:bgFillStyleLst>
+        <a:solidFill>
+          <a:schemeClr val="phClr"/>
+        </a:solidFill>
+        <a:gradFill rotWithShape="1">
+          <a:gsLst>
+            <a:gs pos="0">
+              <a:schemeClr val="phClr">
+                <a:tint val="40000"/>
+                <a:satMod val="350000"/>
+              </a:schemeClr>
+            </a:gs>
+            <a:gs pos="40000">
+              <a:schemeClr val="phClr">
+                <a:tint val="45000"/>
+                <a:shade val="99000"/>
+                <a:satMod val="350000"/>
+              </a:schemeClr>
+            </a:gs>
+            <a:gs pos="100000">
+              <a:schemeClr val="phClr">
+                <a:shade val="20000"/>
+                <a:satMod val="255000"/>
+              </a:schemeClr>
+            </a:gs>
+          </a:gsLst>
+          <a:path path="circle">
+            <a:fillToRect l="50000" t="-80000" r="50000" b="180000"/>
+          </a:path>
+        </a:gradFill>
+        <a:gradFill rotWithShape="1">
+          <a:gsLst>
+            <a:gs pos="0">
+              <a:schemeClr val="phClr">
+                <a:tint val="80000"/>
+                <a:satMod val="300000"/>
+              </a:schemeClr>
+            </a:gs>
+            <a:gs pos="100000">
+              <a:schemeClr val="phClr">
+                <a:shade val="30000"/>
+                <a:satMod val="200000"/>
+              </a:schemeClr>
+            </a:gs>
+          </a:gsLst>
+          <a:path path="circle">
+            <a:fillToRect l="50000" t="50000" r="50000" b="50000"/>
+          </a:path>
+        </a:gradFill>
+      </a:bgFillStyleLst>
+    </a:fmtScheme>
+  </a:themeElements>
+</a:theme>
+</file>
+
+<file path=ppt/theme/theme3.xml><?xml version="1.0" encoding="utf-8"?>
 <a:theme xmlns:a="http://schemas.openxmlformats.org/drawingml/2006/main" xmlns:r="http://schemas.openxmlformats.org/officeDocument/2006/relationships">
   <a:themeElements>
     <a:clrScheme name="Default">
@@ -35791,7 +36377,7 @@
 </a:theme>
 </file>
 
-<file path=ppt/theme/theme2.xml><?xml version="1.0" encoding="utf-8"?>
+<file path=ppt/theme/theme4.xml><?xml version="1.0" encoding="utf-8"?>
 <a:theme xmlns:a="http://schemas.openxmlformats.org/drawingml/2006/main" xmlns:r="http://schemas.openxmlformats.org/officeDocument/2006/relationships" name="Geometric">
   <a:themeElements>
     <a:clrScheme name="Geometric">
@@ -36068,562 +36654,4 @@
     </a:fmtScheme>
   </a:themeElements>
 </a:theme>
-</file>
-
-<file path=ppt/theme/theme3.xml><?xml version="1.0" encoding="utf-8"?>
-<a:theme xmlns:a="http://schemas.openxmlformats.org/drawingml/2006/main" xmlns:r="http://schemas.openxmlformats.org/officeDocument/2006/relationships" name="Simple Light">
-  <a:themeElements>
-    <a:clrScheme name="Simple Light">
-      <a:dk1>
-        <a:srgbClr val="000000"/>
-      </a:dk1>
-      <a:lt1>
-        <a:srgbClr val="FFFFFF"/>
-      </a:lt1>
-      <a:dk2>
-        <a:srgbClr val="595959"/>
-      </a:dk2>
-      <a:lt2>
-        <a:srgbClr val="EEEEEE"/>
-      </a:lt2>
-      <a:accent1>
-        <a:srgbClr val="4285F4"/>
-      </a:accent1>
-      <a:accent2>
-        <a:srgbClr val="212121"/>
-      </a:accent2>
-      <a:accent3>
-        <a:srgbClr val="78909C"/>
-      </a:accent3>
-      <a:accent4>
-        <a:srgbClr val="FFAB40"/>
-      </a:accent4>
-      <a:accent5>
-        <a:srgbClr val="0097A7"/>
-      </a:accent5>
-      <a:accent6>
-        <a:srgbClr val="EEFF41"/>
-      </a:accent6>
-      <a:hlink>
-        <a:srgbClr val="0097A7"/>
-      </a:hlink>
-      <a:folHlink>
-        <a:srgbClr val="0097A7"/>
-      </a:folHlink>
-    </a:clrScheme>
-    <a:fontScheme name="Office">
-      <a:majorFont>
-        <a:latin typeface="Arial"/>
-        <a:ea typeface=""/>
-        <a:cs typeface=""/>
-        <a:font script="Jpan" typeface="ＭＳ Ｐゴシック"/>
-        <a:font script="Hang" typeface="맑은 고딕"/>
-        <a:font script="Hans" typeface="宋体"/>
-        <a:font script="Hant" typeface="新細明體"/>
-        <a:font script="Arab" typeface="Times New Roman"/>
-        <a:font script="Hebr" typeface="Times New Roman"/>
-        <a:font script="Thai" typeface="Angsana New"/>
-        <a:font script="Ethi" typeface="Nyala"/>
-        <a:font script="Beng" typeface="Vrinda"/>
-        <a:font script="Gujr" typeface="Shruti"/>
-        <a:font script="Khmr" typeface="MoolBoran"/>
-        <a:font script="Knda" typeface="Tunga"/>
-        <a:font script="Guru" typeface="Raavi"/>
-        <a:font script="Cans" typeface="Euphemia"/>
-        <a:font script="Cher" typeface="Plantagenet Cherokee"/>
-        <a:font script="Yiii" typeface="Microsoft Yi Baiti"/>
-        <a:font script="Tibt" typeface="Microsoft Himalaya"/>
-        <a:font script="Thaa" typeface="MV Boli"/>
-        <a:font script="Deva" typeface="Mangal"/>
-        <a:font script="Telu" typeface="Gautami"/>
-        <a:font script="Taml" typeface="Latha"/>
-        <a:font script="Syrc" typeface="Estrangelo Edessa"/>
-        <a:font script="Orya" typeface="Kalinga"/>
-        <a:font script="Mlym" typeface="Kartika"/>
-        <a:font script="Laoo" typeface="DokChampa"/>
-        <a:font script="Sinh" typeface="Iskoola Pota"/>
-        <a:font script="Mong" typeface="Mongolian Baiti"/>
-        <a:font script="Viet" typeface="Times New Roman"/>
-        <a:font script="Uigh" typeface="Microsoft Uighur"/>
-        <a:font script="Geor" typeface="Sylfaen"/>
-      </a:majorFont>
-      <a:minorFont>
-        <a:latin typeface="Arial"/>
-        <a:ea typeface=""/>
-        <a:cs typeface=""/>
-        <a:font script="Jpan" typeface="ＭＳ Ｐゴシック"/>
-        <a:font script="Hang" typeface="맑은 고딕"/>
-        <a:font script="Hans" typeface="宋体"/>
-        <a:font script="Hant" typeface="新細明體"/>
-        <a:font script="Arab" typeface="Arial"/>
-        <a:font script="Hebr" typeface="Arial"/>
-        <a:font script="Thai" typeface="Cordia New"/>
-        <a:font script="Ethi" typeface="Nyala"/>
-        <a:font script="Beng" typeface="Vrinda"/>
-        <a:font script="Gujr" typeface="Shruti"/>
-        <a:font script="Khmr" typeface="DaunPenh"/>
-        <a:font script="Knda" typeface="Tunga"/>
-        <a:font script="Guru" typeface="Raavi"/>
-        <a:font script="Cans" typeface="Euphemia"/>
-        <a:font script="Cher" typeface="Plantagenet Cherokee"/>
-        <a:font script="Yiii" typeface="Microsoft Yi Baiti"/>
-        <a:font script="Tibt" typeface="Microsoft Himalaya"/>
-        <a:font script="Thaa" typeface="MV Boli"/>
-        <a:font script="Deva" typeface="Mangal"/>
-        <a:font script="Telu" typeface="Gautami"/>
-        <a:font script="Taml" typeface="Latha"/>
-        <a:font script="Syrc" typeface="Estrangelo Edessa"/>
-        <a:font script="Orya" typeface="Kalinga"/>
-        <a:font script="Mlym" typeface="Kartika"/>
-        <a:font script="Laoo" typeface="DokChampa"/>
-        <a:font script="Sinh" typeface="Iskoola Pota"/>
-        <a:font script="Mong" typeface="Mongolian Baiti"/>
-        <a:font script="Viet" typeface="Arial"/>
-        <a:font script="Uigh" typeface="Microsoft Uighur"/>
-        <a:font script="Geor" typeface="Sylfaen"/>
-      </a:minorFont>
-    </a:fontScheme>
-    <a:fmtScheme name="Office">
-      <a:fillStyleLst>
-        <a:solidFill>
-          <a:schemeClr val="phClr"/>
-        </a:solidFill>
-        <a:gradFill rotWithShape="1">
-          <a:gsLst>
-            <a:gs pos="0">
-              <a:schemeClr val="phClr">
-                <a:tint val="50000"/>
-                <a:satMod val="300000"/>
-              </a:schemeClr>
-            </a:gs>
-            <a:gs pos="35000">
-              <a:schemeClr val="phClr">
-                <a:tint val="37000"/>
-                <a:satMod val="300000"/>
-              </a:schemeClr>
-            </a:gs>
-            <a:gs pos="100000">
-              <a:schemeClr val="phClr">
-                <a:tint val="15000"/>
-                <a:satMod val="350000"/>
-              </a:schemeClr>
-            </a:gs>
-          </a:gsLst>
-          <a:lin ang="16200000" scaled="1"/>
-        </a:gradFill>
-        <a:gradFill rotWithShape="1">
-          <a:gsLst>
-            <a:gs pos="0">
-              <a:schemeClr val="phClr">
-                <a:tint val="100000"/>
-                <a:shade val="100000"/>
-                <a:satMod val="130000"/>
-              </a:schemeClr>
-            </a:gs>
-            <a:gs pos="100000">
-              <a:schemeClr val="phClr">
-                <a:tint val="50000"/>
-                <a:shade val="100000"/>
-                <a:satMod val="350000"/>
-              </a:schemeClr>
-            </a:gs>
-          </a:gsLst>
-          <a:lin ang="16200000" scaled="0"/>
-        </a:gradFill>
-      </a:fillStyleLst>
-      <a:lnStyleLst>
-        <a:ln w="9525" cap="flat" cmpd="sng" algn="ctr">
-          <a:solidFill>
-            <a:schemeClr val="phClr">
-              <a:shade val="95000"/>
-              <a:satMod val="105000"/>
-            </a:schemeClr>
-          </a:solidFill>
-          <a:prstDash val="solid"/>
-        </a:ln>
-        <a:ln w="25400" cap="flat" cmpd="sng" algn="ctr">
-          <a:solidFill>
-            <a:schemeClr val="phClr"/>
-          </a:solidFill>
-          <a:prstDash val="solid"/>
-        </a:ln>
-        <a:ln w="38100" cap="flat" cmpd="sng" algn="ctr">
-          <a:solidFill>
-            <a:schemeClr val="phClr"/>
-          </a:solidFill>
-          <a:prstDash val="solid"/>
-        </a:ln>
-      </a:lnStyleLst>
-      <a:effectStyleLst>
-        <a:effectStyle>
-          <a:effectLst>
-            <a:outerShdw blurRad="40000" dist="20000" dir="5400000" rotWithShape="0">
-              <a:srgbClr val="000000">
-                <a:alpha val="38000"/>
-              </a:srgbClr>
-            </a:outerShdw>
-          </a:effectLst>
-        </a:effectStyle>
-        <a:effectStyle>
-          <a:effectLst>
-            <a:outerShdw blurRad="40000" dist="23000" dir="5400000" rotWithShape="0">
-              <a:srgbClr val="000000">
-                <a:alpha val="35000"/>
-              </a:srgbClr>
-            </a:outerShdw>
-          </a:effectLst>
-        </a:effectStyle>
-        <a:effectStyle>
-          <a:effectLst>
-            <a:outerShdw blurRad="40000" dist="23000" dir="5400000" rotWithShape="0">
-              <a:srgbClr val="000000">
-                <a:alpha val="35000"/>
-              </a:srgbClr>
-            </a:outerShdw>
-          </a:effectLst>
-          <a:scene3d>
-            <a:camera prst="orthographicFront">
-              <a:rot lat="0" lon="0" rev="0"/>
-            </a:camera>
-            <a:lightRig rig="threePt" dir="t">
-              <a:rot lat="0" lon="0" rev="1200000"/>
-            </a:lightRig>
-          </a:scene3d>
-          <a:sp3d>
-            <a:bevelT w="63500" h="25400"/>
-          </a:sp3d>
-        </a:effectStyle>
-      </a:effectStyleLst>
-      <a:bgFillStyleLst>
-        <a:solidFill>
-          <a:schemeClr val="phClr"/>
-        </a:solidFill>
-        <a:gradFill rotWithShape="1">
-          <a:gsLst>
-            <a:gs pos="0">
-              <a:schemeClr val="phClr">
-                <a:tint val="40000"/>
-                <a:satMod val="350000"/>
-              </a:schemeClr>
-            </a:gs>
-            <a:gs pos="40000">
-              <a:schemeClr val="phClr">
-                <a:tint val="45000"/>
-                <a:shade val="99000"/>
-                <a:satMod val="350000"/>
-              </a:schemeClr>
-            </a:gs>
-            <a:gs pos="100000">
-              <a:schemeClr val="phClr">
-                <a:shade val="20000"/>
-                <a:satMod val="255000"/>
-              </a:schemeClr>
-            </a:gs>
-          </a:gsLst>
-          <a:path path="circle">
-            <a:fillToRect l="50000" t="-80000" r="50000" b="180000"/>
-          </a:path>
-        </a:gradFill>
-        <a:gradFill rotWithShape="1">
-          <a:gsLst>
-            <a:gs pos="0">
-              <a:schemeClr val="phClr">
-                <a:tint val="80000"/>
-                <a:satMod val="300000"/>
-              </a:schemeClr>
-            </a:gs>
-            <a:gs pos="100000">
-              <a:schemeClr val="phClr">
-                <a:shade val="30000"/>
-                <a:satMod val="200000"/>
-              </a:schemeClr>
-            </a:gs>
-          </a:gsLst>
-          <a:path path="circle">
-            <a:fillToRect l="50000" t="50000" r="50000" b="50000"/>
-          </a:path>
-        </a:gradFill>
-      </a:bgFillStyleLst>
-    </a:fmtScheme>
-  </a:themeElements>
-</a:theme>
-</file>
-
-<file path=ppt/theme/theme4.xml><?xml version="1.0" encoding="utf-8"?>
-<a:theme xmlns:a="http://schemas.openxmlformats.org/drawingml/2006/main" xmlns:r="http://schemas.openxmlformats.org/officeDocument/2006/relationships" name="Simple Light">
-  <a:themeElements>
-    <a:clrScheme name="Simple Light">
-      <a:dk1>
-        <a:srgbClr val="000000"/>
-      </a:dk1>
-      <a:lt1>
-        <a:srgbClr val="FFFFFF"/>
-      </a:lt1>
-      <a:dk2>
-        <a:srgbClr val="595959"/>
-      </a:dk2>
-      <a:lt2>
-        <a:srgbClr val="EEEEEE"/>
-      </a:lt2>
-      <a:accent1>
-        <a:srgbClr val="4285F4"/>
-      </a:accent1>
-      <a:accent2>
-        <a:srgbClr val="212121"/>
-      </a:accent2>
-      <a:accent3>
-        <a:srgbClr val="78909C"/>
-      </a:accent3>
-      <a:accent4>
-        <a:srgbClr val="FFAB40"/>
-      </a:accent4>
-      <a:accent5>
-        <a:srgbClr val="0097A7"/>
-      </a:accent5>
-      <a:accent6>
-        <a:srgbClr val="EEFF41"/>
-      </a:accent6>
-      <a:hlink>
-        <a:srgbClr val="0097A7"/>
-      </a:hlink>
-      <a:folHlink>
-        <a:srgbClr val="0097A7"/>
-      </a:folHlink>
-    </a:clrScheme>
-    <a:fontScheme name="Office">
-      <a:majorFont>
-        <a:latin typeface="Arial"/>
-        <a:ea typeface=""/>
-        <a:cs typeface=""/>
-        <a:font script="Jpan" typeface="ＭＳ Ｐゴシック"/>
-        <a:font script="Hang" typeface="맑은 고딕"/>
-        <a:font script="Hans" typeface="宋体"/>
-        <a:font script="Hant" typeface="新細明體"/>
-        <a:font script="Arab" typeface="Times New Roman"/>
-        <a:font script="Hebr" typeface="Times New Roman"/>
-        <a:font script="Thai" typeface="Angsana New"/>
-        <a:font script="Ethi" typeface="Nyala"/>
-        <a:font script="Beng" typeface="Vrinda"/>
-        <a:font script="Gujr" typeface="Shruti"/>
-        <a:font script="Khmr" typeface="MoolBoran"/>
-        <a:font script="Knda" typeface="Tunga"/>
-        <a:font script="Guru" typeface="Raavi"/>
-        <a:font script="Cans" typeface="Euphemia"/>
-        <a:font script="Cher" typeface="Plantagenet Cherokee"/>
-        <a:font script="Yiii" typeface="Microsoft Yi Baiti"/>
-        <a:font script="Tibt" typeface="Microsoft Himalaya"/>
-        <a:font script="Thaa" typeface="MV Boli"/>
-        <a:font script="Deva" typeface="Mangal"/>
-        <a:font script="Telu" typeface="Gautami"/>
-        <a:font script="Taml" typeface="Latha"/>
-        <a:font script="Syrc" typeface="Estrangelo Edessa"/>
-        <a:font script="Orya" typeface="Kalinga"/>
-        <a:font script="Mlym" typeface="Kartika"/>
-        <a:font script="Laoo" typeface="DokChampa"/>
-        <a:font script="Sinh" typeface="Iskoola Pota"/>
-        <a:font script="Mong" typeface="Mongolian Baiti"/>
-        <a:font script="Viet" typeface="Times New Roman"/>
-        <a:font script="Uigh" typeface="Microsoft Uighur"/>
-        <a:font script="Geor" typeface="Sylfaen"/>
-      </a:majorFont>
-      <a:minorFont>
-        <a:latin typeface="Arial"/>
-        <a:ea typeface=""/>
-        <a:cs typeface=""/>
-        <a:font script="Jpan" typeface="ＭＳ Ｐゴシック"/>
-        <a:font script="Hang" typeface="맑은 고딕"/>
-        <a:font script="Hans" typeface="宋体"/>
-        <a:font script="Hant" typeface="新細明體"/>
-        <a:font script="Arab" typeface="Arial"/>
-        <a:font script="Hebr" typeface="Arial"/>
-        <a:font script="Thai" typeface="Cordia New"/>
-        <a:font script="Ethi" typeface="Nyala"/>
-        <a:font script="Beng" typeface="Vrinda"/>
-        <a:font script="Gujr" typeface="Shruti"/>
-        <a:font script="Khmr" typeface="DaunPenh"/>
-        <a:font script="Knda" typeface="Tunga"/>
-        <a:font script="Guru" typeface="Raavi"/>
-        <a:font script="Cans" typeface="Euphemia"/>
-        <a:font script="Cher" typeface="Plantagenet Cherokee"/>
-        <a:font script="Yiii" typeface="Microsoft Yi Baiti"/>
-        <a:font script="Tibt" typeface="Microsoft Himalaya"/>
-        <a:font script="Thaa" typeface="MV Boli"/>
-        <a:font script="Deva" typeface="Mangal"/>
-        <a:font script="Telu" typeface="Gautami"/>
-        <a:font script="Taml" typeface="Latha"/>
-        <a:font script="Syrc" typeface="Estrangelo Edessa"/>
-        <a:font script="Orya" typeface="Kalinga"/>
-        <a:font script="Mlym" typeface="Kartika"/>
-        <a:font script="Laoo" typeface="DokChampa"/>
-        <a:font script="Sinh" typeface="Iskoola Pota"/>
-        <a:font script="Mong" typeface="Mongolian Baiti"/>
-        <a:font script="Viet" typeface="Arial"/>
-        <a:font script="Uigh" typeface="Microsoft Uighur"/>
-        <a:font script="Geor" typeface="Sylfaen"/>
-      </a:minorFont>
-    </a:fontScheme>
-    <a:fmtScheme name="Office">
-      <a:fillStyleLst>
-        <a:solidFill>
-          <a:schemeClr val="phClr"/>
-        </a:solidFill>
-        <a:gradFill rotWithShape="1">
-          <a:gsLst>
-            <a:gs pos="0">
-              <a:schemeClr val="phClr">
-                <a:tint val="50000"/>
-                <a:satMod val="300000"/>
-              </a:schemeClr>
-            </a:gs>
-            <a:gs pos="35000">
-              <a:schemeClr val="phClr">
-                <a:tint val="37000"/>
-                <a:satMod val="300000"/>
-              </a:schemeClr>
-            </a:gs>
-            <a:gs pos="100000">
-              <a:schemeClr val="phClr">
-                <a:tint val="15000"/>
-                <a:satMod val="350000"/>
-              </a:schemeClr>
-            </a:gs>
-          </a:gsLst>
-          <a:lin ang="16200000" scaled="1"/>
-        </a:gradFill>
-        <a:gradFill rotWithShape="1">
-          <a:gsLst>
-            <a:gs pos="0">
-              <a:schemeClr val="phClr">
-                <a:tint val="100000"/>
-                <a:shade val="100000"/>
-                <a:satMod val="130000"/>
-              </a:schemeClr>
-            </a:gs>
-            <a:gs pos="100000">
-              <a:schemeClr val="phClr">
-                <a:tint val="50000"/>
-                <a:shade val="100000"/>
-                <a:satMod val="350000"/>
-              </a:schemeClr>
-            </a:gs>
-          </a:gsLst>
-          <a:lin ang="16200000" scaled="0"/>
-        </a:gradFill>
-      </a:fillStyleLst>
-      <a:lnStyleLst>
-        <a:ln w="9525" cap="flat" cmpd="sng" algn="ctr">
-          <a:solidFill>
-            <a:schemeClr val="phClr">
-              <a:shade val="95000"/>
-              <a:satMod val="105000"/>
-            </a:schemeClr>
-          </a:solidFill>
-          <a:prstDash val="solid"/>
-        </a:ln>
-        <a:ln w="25400" cap="flat" cmpd="sng" algn="ctr">
-          <a:solidFill>
-            <a:schemeClr val="phClr"/>
-          </a:solidFill>
-          <a:prstDash val="solid"/>
-        </a:ln>
-        <a:ln w="38100" cap="flat" cmpd="sng" algn="ctr">
-          <a:solidFill>
-            <a:schemeClr val="phClr"/>
-          </a:solidFill>
-          <a:prstDash val="solid"/>
-        </a:ln>
-      </a:lnStyleLst>
-      <a:effectStyleLst>
-        <a:effectStyle>
-          <a:effectLst>
-            <a:outerShdw blurRad="40000" dist="20000" dir="5400000" rotWithShape="0">
-              <a:srgbClr val="000000">
-                <a:alpha val="38000"/>
-              </a:srgbClr>
-            </a:outerShdw>
-          </a:effectLst>
-        </a:effectStyle>
-        <a:effectStyle>
-          <a:effectLst>
-            <a:outerShdw blurRad="40000" dist="23000" dir="5400000" rotWithShape="0">
-              <a:srgbClr val="000000">
-                <a:alpha val="35000"/>
-              </a:srgbClr>
-            </a:outerShdw>
-          </a:effectLst>
-        </a:effectStyle>
-        <a:effectStyle>
-          <a:effectLst>
-            <a:outerShdw blurRad="40000" dist="23000" dir="5400000" rotWithShape="0">
-              <a:srgbClr val="000000">
-                <a:alpha val="35000"/>
-              </a:srgbClr>
-            </a:outerShdw>
-          </a:effectLst>
-          <a:scene3d>
-            <a:camera prst="orthographicFront">
-              <a:rot lat="0" lon="0" rev="0"/>
-            </a:camera>
-            <a:lightRig rig="threePt" dir="t">
-              <a:rot lat="0" lon="0" rev="1200000"/>
-            </a:lightRig>
-          </a:scene3d>
-          <a:sp3d>
-            <a:bevelT w="63500" h="25400"/>
-          </a:sp3d>
-        </a:effectStyle>
-      </a:effectStyleLst>
-      <a:bgFillStyleLst>
-        <a:solidFill>
-          <a:schemeClr val="phClr"/>
-        </a:solidFill>
-        <a:gradFill rotWithShape="1">
-          <a:gsLst>
-            <a:gs pos="0">
-              <a:schemeClr val="phClr">
-                <a:tint val="40000"/>
-                <a:satMod val="350000"/>
-              </a:schemeClr>
-            </a:gs>
-            <a:gs pos="40000">
-              <a:schemeClr val="phClr">
-                <a:tint val="45000"/>
-                <a:shade val="99000"/>
-                <a:satMod val="350000"/>
-              </a:schemeClr>
-            </a:gs>
-            <a:gs pos="100000">
-              <a:schemeClr val="phClr">
-                <a:shade val="20000"/>
-                <a:satMod val="255000"/>
-              </a:schemeClr>
-            </a:gs>
-          </a:gsLst>
-          <a:path path="circle">
-            <a:fillToRect l="50000" t="-80000" r="50000" b="180000"/>
-          </a:path>
-        </a:gradFill>
-        <a:gradFill rotWithShape="1">
-          <a:gsLst>
-            <a:gs pos="0">
-              <a:schemeClr val="phClr">
-                <a:tint val="80000"/>
-                <a:satMod val="300000"/>
-              </a:schemeClr>
-            </a:gs>
-            <a:gs pos="100000">
-              <a:schemeClr val="phClr">
-                <a:shade val="30000"/>
-                <a:satMod val="200000"/>
-              </a:schemeClr>
-            </a:gs>
-          </a:gsLst>
-          <a:path path="circle">
-            <a:fillToRect l="50000" t="50000" r="50000" b="50000"/>
-          </a:path>
-        </a:gradFill>
-      </a:bgFillStyleLst>
-    </a:fmtScheme>
-  </a:themeElements>
-</a:theme>
 </file>
</xml_diff>